<commit_message>
prp v4 and text
</commit_message>
<xml_diff>
--- a/Sorting.pptx
+++ b/Sorting.pptx
@@ -14,12 +14,12 @@
   <p:sldIdLst>
     <p:sldId id="523" r:id="rId3"/>
     <p:sldId id="495" r:id="rId4"/>
-    <p:sldId id="511" r:id="rId5"/>
-    <p:sldId id="496" r:id="rId6"/>
-    <p:sldId id="497" r:id="rId7"/>
-    <p:sldId id="513" r:id="rId8"/>
-    <p:sldId id="514" r:id="rId9"/>
-    <p:sldId id="516" r:id="rId10"/>
+    <p:sldId id="497" r:id="rId5"/>
+    <p:sldId id="513" r:id="rId6"/>
+    <p:sldId id="514" r:id="rId7"/>
+    <p:sldId id="516" r:id="rId8"/>
+    <p:sldId id="525" r:id="rId9"/>
+    <p:sldId id="526" r:id="rId10"/>
     <p:sldId id="520" r:id="rId11"/>
     <p:sldId id="521" r:id="rId12"/>
     <p:sldId id="524" r:id="rId13"/>
@@ -267,7 +267,7 @@
             <a:fld id="{8F99CBD8-0CB9-436D-88F8-43AB91C18435}" type="datetime1">
               <a:rPr lang="en-US" altLang="ru-RU"/>
               <a:pPr/>
-              <a:t>4/21/2018</a:t>
+              <a:t>4/24/2018</a:t>
             </a:fld>
             <a:endParaRPr lang="en-US" altLang="ru-RU"/>
           </a:p>
@@ -454,7 +454,7 @@
             <a:fld id="{D8475F42-D7A5-469B-BF7F-C0F37AE6711D}" type="datetime1">
               <a:rPr lang="en-US" altLang="ru-RU"/>
               <a:pPr/>
-              <a:t>4/21/2018</a:t>
+              <a:t>4/24/2018</a:t>
             </a:fld>
             <a:endParaRPr lang="en-US" altLang="ru-RU"/>
           </a:p>
@@ -819,14 +819,14 @@
           </a:ln>
           <a:extLst>
             <a:ext uri="{909E8E84-426E-40dd-AFC4-6F175D3DCCD1}">
-              <a14:hiddenFill xmlns:a14="http://schemas.microsoft.com/office/drawing/2010/main" xmlns="">
+              <a14:hiddenFill xmlns="" xmlns:a14="http://schemas.microsoft.com/office/drawing/2010/main">
                 <a:solidFill>
                   <a:srgbClr val="FFFFFF"/>
                 </a:solidFill>
               </a14:hiddenFill>
             </a:ext>
             <a:ext uri="{91240B29-F687-4f45-9708-019B960494DF}">
-              <a14:hiddenLine xmlns:a14="http://schemas.microsoft.com/office/drawing/2010/main" xmlns="" w="9525">
+              <a14:hiddenLine xmlns="" xmlns:a14="http://schemas.microsoft.com/office/drawing/2010/main" w="9525">
                 <a:solidFill>
                   <a:srgbClr val="000000"/>
                 </a:solidFill>
@@ -1452,7 +1452,7 @@
           <a:noFill/>
           <a:extLst>
             <a:ext uri="{909E8E84-426E-40dd-AFC4-6F175D3DCCD1}">
-              <a14:hiddenFill xmlns:a14="http://schemas.microsoft.com/office/drawing/2010/main" xmlns="">
+              <a14:hiddenFill xmlns="" xmlns:a14="http://schemas.microsoft.com/office/drawing/2010/main">
                 <a:solidFill>
                   <a:srgbClr val="FFFFFF"/>
                 </a:solidFill>
@@ -1676,14 +1676,14 @@
           </a:ln>
           <a:extLst>
             <a:ext uri="{909E8E84-426E-40dd-AFC4-6F175D3DCCD1}">
-              <a14:hiddenFill xmlns:a14="http://schemas.microsoft.com/office/drawing/2010/main" xmlns="">
+              <a14:hiddenFill xmlns="" xmlns:a14="http://schemas.microsoft.com/office/drawing/2010/main">
                 <a:solidFill>
                   <a:srgbClr val="FFFFFF"/>
                 </a:solidFill>
               </a14:hiddenFill>
             </a:ext>
             <a:ext uri="{91240B29-F687-4f45-9708-019B960494DF}">
-              <a14:hiddenLine xmlns:a14="http://schemas.microsoft.com/office/drawing/2010/main" xmlns="" w="9525">
+              <a14:hiddenLine xmlns="" xmlns:a14="http://schemas.microsoft.com/office/drawing/2010/main" w="9525">
                 <a:solidFill>
                   <a:srgbClr val="000000"/>
                 </a:solidFill>
@@ -1935,7 +1935,7 @@
           <a:noFill/>
           <a:extLst>
             <a:ext uri="{909E8E84-426E-40dd-AFC4-6F175D3DCCD1}">
-              <a14:hiddenFill xmlns:a14="http://schemas.microsoft.com/office/drawing/2010/main" xmlns="">
+              <a14:hiddenFill xmlns="" xmlns:a14="http://schemas.microsoft.com/office/drawing/2010/main">
                 <a:solidFill>
                   <a:srgbClr val="FFFFFF"/>
                 </a:solidFill>
@@ -2055,14 +2055,14 @@
           </a:ln>
           <a:extLst>
             <a:ext uri="{909E8E84-426E-40dd-AFC4-6F175D3DCCD1}">
-              <a14:hiddenFill xmlns:a14="http://schemas.microsoft.com/office/drawing/2010/main" xmlns="">
+              <a14:hiddenFill xmlns="" xmlns:a14="http://schemas.microsoft.com/office/drawing/2010/main">
                 <a:solidFill>
                   <a:srgbClr val="FFFFFF"/>
                 </a:solidFill>
               </a14:hiddenFill>
             </a:ext>
             <a:ext uri="{91240B29-F687-4f45-9708-019B960494DF}">
-              <a14:hiddenLine xmlns:a14="http://schemas.microsoft.com/office/drawing/2010/main" xmlns="" w="9525">
+              <a14:hiddenLine xmlns="" xmlns:a14="http://schemas.microsoft.com/office/drawing/2010/main" w="9525">
                 <a:solidFill>
                   <a:srgbClr val="000000"/>
                 </a:solidFill>
@@ -2513,7 +2513,7 @@
           <a:noFill/>
           <a:extLst>
             <a:ext uri="{909E8E84-426E-40dd-AFC4-6F175D3DCCD1}">
-              <a14:hiddenFill xmlns:a14="http://schemas.microsoft.com/office/drawing/2010/main" xmlns="">
+              <a14:hiddenFill xmlns="" xmlns:a14="http://schemas.microsoft.com/office/drawing/2010/main">
                 <a:solidFill>
                   <a:srgbClr val="FFFFFF"/>
                 </a:solidFill>
@@ -2923,14 +2923,14 @@
             </a:ln>
             <a:extLst>
               <a:ext uri="{909E8E84-426E-40dd-AFC4-6F175D3DCCD1}">
-                <a14:hiddenFill xmlns:a14="http://schemas.microsoft.com/office/drawing/2010/main" xmlns="">
+                <a14:hiddenFill xmlns="" xmlns:a14="http://schemas.microsoft.com/office/drawing/2010/main">
                   <a:solidFill>
                     <a:srgbClr val="FFFFFF"/>
                   </a:solidFill>
                 </a14:hiddenFill>
               </a:ext>
               <a:ext uri="{91240B29-F687-4f45-9708-019B960494DF}">
-                <a14:hiddenLine xmlns:a14="http://schemas.microsoft.com/office/drawing/2010/main" xmlns="" w="9525">
+                <a14:hiddenLine xmlns="" xmlns:a14="http://schemas.microsoft.com/office/drawing/2010/main" w="9525">
                   <a:solidFill>
                     <a:srgbClr val="000000"/>
                   </a:solidFill>
@@ -3117,7 +3117,7 @@
           <a:noFill/>
           <a:extLst>
             <a:ext uri="{909E8E84-426E-40dd-AFC4-6F175D3DCCD1}">
-              <a14:hiddenFill xmlns:a14="http://schemas.microsoft.com/office/drawing/2010/main" xmlns="">
+              <a14:hiddenFill xmlns="" xmlns:a14="http://schemas.microsoft.com/office/drawing/2010/main">
                 <a:solidFill>
                   <a:srgbClr val="FFFFFF"/>
                 </a:solidFill>
@@ -3670,14 +3670,14 @@
             </a:ln>
             <a:extLst>
               <a:ext uri="{909E8E84-426E-40dd-AFC4-6F175D3DCCD1}">
-                <a14:hiddenFill xmlns:a14="http://schemas.microsoft.com/office/drawing/2010/main" xmlns="">
+                <a14:hiddenFill xmlns="" xmlns:a14="http://schemas.microsoft.com/office/drawing/2010/main">
                   <a:solidFill>
                     <a:srgbClr val="FFFFFF"/>
                   </a:solidFill>
                 </a14:hiddenFill>
               </a:ext>
               <a:ext uri="{91240B29-F687-4f45-9708-019B960494DF}">
-                <a14:hiddenLine xmlns:a14="http://schemas.microsoft.com/office/drawing/2010/main" xmlns="" w="9525">
+                <a14:hiddenLine xmlns="" xmlns:a14="http://schemas.microsoft.com/office/drawing/2010/main" w="9525">
                   <a:solidFill>
                     <a:srgbClr val="000000"/>
                   </a:solidFill>
@@ -3864,7 +3864,7 @@
           <a:noFill/>
           <a:extLst>
             <a:ext uri="{909E8E84-426E-40dd-AFC4-6F175D3DCCD1}">
-              <a14:hiddenFill xmlns:a14="http://schemas.microsoft.com/office/drawing/2010/main" xmlns="">
+              <a14:hiddenFill xmlns="" xmlns:a14="http://schemas.microsoft.com/office/drawing/2010/main">
                 <a:solidFill>
                   <a:srgbClr val="FFFFFF"/>
                 </a:solidFill>
@@ -3953,14 +3953,14 @@
             </a:ln>
             <a:extLst>
               <a:ext uri="{909E8E84-426E-40dd-AFC4-6F175D3DCCD1}">
-                <a14:hiddenFill xmlns:a14="http://schemas.microsoft.com/office/drawing/2010/main" xmlns="">
+                <a14:hiddenFill xmlns="" xmlns:a14="http://schemas.microsoft.com/office/drawing/2010/main">
                   <a:solidFill>
                     <a:srgbClr val="FFFFFF"/>
                   </a:solidFill>
                 </a14:hiddenFill>
               </a:ext>
               <a:ext uri="{91240B29-F687-4f45-9708-019B960494DF}">
-                <a14:hiddenLine xmlns:a14="http://schemas.microsoft.com/office/drawing/2010/main" xmlns="" w="9525">
+                <a14:hiddenLine xmlns="" xmlns:a14="http://schemas.microsoft.com/office/drawing/2010/main" w="9525">
                   <a:solidFill>
                     <a:srgbClr val="000000"/>
                   </a:solidFill>
@@ -4302,7 +4302,7 @@
           <a:noFill/>
           <a:extLst>
             <a:ext uri="{909E8E84-426E-40dd-AFC4-6F175D3DCCD1}">
-              <a14:hiddenFill xmlns:a14="http://schemas.microsoft.com/office/drawing/2010/main" xmlns="">
+              <a14:hiddenFill xmlns="" xmlns:a14="http://schemas.microsoft.com/office/drawing/2010/main">
                 <a:solidFill>
                   <a:srgbClr val="FFFFFF"/>
                 </a:solidFill>
@@ -4807,7 +4807,7 @@
           </a:ln>
           <a:extLst>
             <a:ext uri="{C572A759-6A51-4108-AA02-DFA0A04FC94B}">
-              <ma14:wrappingTextBoxFlag xmlns:ma14="http://schemas.microsoft.com/office/mac/drawingml/2011/main" xmlns="" val="1"/>
+              <ma14:wrappingTextBoxFlag xmlns="" xmlns:ma14="http://schemas.microsoft.com/office/mac/drawingml/2011/main" val="1"/>
             </a:ext>
           </a:extLst>
         </p:spPr>
@@ -4859,7 +4859,7 @@
           <a:noFill/>
           <a:extLst>
             <a:ext uri="{909E8E84-426E-40dd-AFC4-6F175D3DCCD1}">
-              <a14:hiddenFill xmlns:a14="http://schemas.microsoft.com/office/drawing/2010/main" xmlns="">
+              <a14:hiddenFill xmlns="" xmlns:a14="http://schemas.microsoft.com/office/drawing/2010/main">
                 <a:solidFill>
                   <a:srgbClr val="FFFFFF"/>
                 </a:solidFill>
@@ -5243,14 +5243,14 @@
           </a:ln>
           <a:extLst>
             <a:ext uri="{909E8E84-426E-40dd-AFC4-6F175D3DCCD1}">
-              <a14:hiddenFill xmlns:a14="http://schemas.microsoft.com/office/drawing/2010/main" xmlns="">
+              <a14:hiddenFill xmlns="" xmlns:a14="http://schemas.microsoft.com/office/drawing/2010/main">
                 <a:solidFill>
                   <a:srgbClr val="FFFFFF"/>
                 </a:solidFill>
               </a14:hiddenFill>
             </a:ext>
             <a:ext uri="{91240B29-F687-4f45-9708-019B960494DF}">
-              <a14:hiddenLine xmlns:a14="http://schemas.microsoft.com/office/drawing/2010/main" xmlns="" w="9525">
+              <a14:hiddenLine xmlns="" xmlns:a14="http://schemas.microsoft.com/office/drawing/2010/main" w="9525">
                 <a:solidFill>
                   <a:srgbClr val="000000"/>
                 </a:solidFill>
@@ -6451,14 +6451,14 @@
           </a:ln>
           <a:extLst>
             <a:ext uri="{909E8E84-426E-40dd-AFC4-6F175D3DCCD1}">
-              <a14:hiddenFill xmlns:a14="http://schemas.microsoft.com/office/drawing/2010/main" xmlns="">
+              <a14:hiddenFill xmlns="" xmlns:a14="http://schemas.microsoft.com/office/drawing/2010/main">
                 <a:solidFill>
                   <a:srgbClr val="FFFFFF"/>
                 </a:solidFill>
               </a14:hiddenFill>
             </a:ext>
             <a:ext uri="{91240B29-F687-4f45-9708-019B960494DF}">
-              <a14:hiddenLine xmlns:a14="http://schemas.microsoft.com/office/drawing/2010/main" xmlns="" w="9525">
+              <a14:hiddenLine xmlns="" xmlns:a14="http://schemas.microsoft.com/office/drawing/2010/main" w="9525">
                 <a:solidFill>
                   <a:srgbClr val="000000"/>
                 </a:solidFill>
@@ -6962,14 +6962,14 @@
             </a:ln>
             <a:extLst>
               <a:ext uri="{909E8E84-426E-40dd-AFC4-6F175D3DCCD1}">
-                <a14:hiddenFill xmlns:a14="http://schemas.microsoft.com/office/drawing/2010/main" xmlns="">
+                <a14:hiddenFill xmlns="" xmlns:a14="http://schemas.microsoft.com/office/drawing/2010/main">
                   <a:solidFill>
                     <a:srgbClr val="FFFFFF"/>
                   </a:solidFill>
                 </a14:hiddenFill>
               </a:ext>
               <a:ext uri="{91240B29-F687-4f45-9708-019B960494DF}">
-                <a14:hiddenLine xmlns:a14="http://schemas.microsoft.com/office/drawing/2010/main" xmlns="" w="9525">
+                <a14:hiddenLine xmlns="" xmlns:a14="http://schemas.microsoft.com/office/drawing/2010/main" w="9525">
                   <a:solidFill>
                     <a:srgbClr val="000000"/>
                   </a:solidFill>
@@ -7532,7 +7532,7 @@
           <a:noFill/>
           <a:extLst>
             <a:ext uri="{909E8E84-426E-40dd-AFC4-6F175D3DCCD1}">
-              <a14:hiddenFill xmlns:a14="http://schemas.microsoft.com/office/drawing/2010/main" xmlns="">
+              <a14:hiddenFill xmlns="" xmlns:a14="http://schemas.microsoft.com/office/drawing/2010/main">
                 <a:solidFill>
                   <a:srgbClr val="FFFFFF"/>
                 </a:solidFill>
@@ -7853,14 +7853,14 @@
             </a:ln>
             <a:extLst>
               <a:ext uri="{909E8E84-426E-40dd-AFC4-6F175D3DCCD1}">
-                <a14:hiddenFill xmlns:a14="http://schemas.microsoft.com/office/drawing/2010/main" xmlns="">
+                <a14:hiddenFill xmlns="" xmlns:a14="http://schemas.microsoft.com/office/drawing/2010/main">
                   <a:solidFill>
                     <a:srgbClr val="FFFFFF"/>
                   </a:solidFill>
                 </a14:hiddenFill>
               </a:ext>
               <a:ext uri="{91240B29-F687-4f45-9708-019B960494DF}">
-                <a14:hiddenLine xmlns:a14="http://schemas.microsoft.com/office/drawing/2010/main" xmlns="" w="9525">
+                <a14:hiddenLine xmlns="" xmlns:a14="http://schemas.microsoft.com/office/drawing/2010/main" w="9525">
                   <a:solidFill>
                     <a:srgbClr val="000000"/>
                   </a:solidFill>
@@ -8047,7 +8047,7 @@
           <a:noFill/>
           <a:extLst>
             <a:ext uri="{909E8E84-426E-40dd-AFC4-6F175D3DCCD1}">
-              <a14:hiddenFill xmlns:a14="http://schemas.microsoft.com/office/drawing/2010/main" xmlns="">
+              <a14:hiddenFill xmlns="" xmlns:a14="http://schemas.microsoft.com/office/drawing/2010/main">
                 <a:solidFill>
                   <a:srgbClr val="FFFFFF"/>
                 </a:solidFill>
@@ -8345,14 +8345,14 @@
             </a:ln>
             <a:extLst>
               <a:ext uri="{909E8E84-426E-40dd-AFC4-6F175D3DCCD1}">
-                <a14:hiddenFill xmlns:a14="http://schemas.microsoft.com/office/drawing/2010/main" xmlns="">
+                <a14:hiddenFill xmlns="" xmlns:a14="http://schemas.microsoft.com/office/drawing/2010/main">
                   <a:solidFill>
                     <a:srgbClr val="FFFFFF"/>
                   </a:solidFill>
                 </a14:hiddenFill>
               </a:ext>
               <a:ext uri="{91240B29-F687-4f45-9708-019B960494DF}">
-                <a14:hiddenLine xmlns:a14="http://schemas.microsoft.com/office/drawing/2010/main" xmlns="" w="9525">
+                <a14:hiddenLine xmlns="" xmlns:a14="http://schemas.microsoft.com/office/drawing/2010/main" w="9525">
                   <a:solidFill>
                     <a:srgbClr val="000000"/>
                   </a:solidFill>
@@ -8539,7 +8539,7 @@
           <a:noFill/>
           <a:extLst>
             <a:ext uri="{909E8E84-426E-40dd-AFC4-6F175D3DCCD1}">
-              <a14:hiddenFill xmlns:a14="http://schemas.microsoft.com/office/drawing/2010/main" xmlns="">
+              <a14:hiddenFill xmlns="" xmlns:a14="http://schemas.microsoft.com/office/drawing/2010/main">
                 <a:solidFill>
                   <a:srgbClr val="FFFFFF"/>
                 </a:solidFill>
@@ -9511,7 +9511,7 @@
         </p:nvSpPr>
         <p:spPr>
           <a:xfrm>
-            <a:off x="2512540" y="5126042"/>
+            <a:off x="2512540" y="5065657"/>
             <a:ext cx="4281096" cy="1307710"/>
           </a:xfrm>
         </p:spPr>
@@ -9782,7 +9782,7 @@
         </p:nvSpPr>
         <p:spPr>
           <a:xfrm>
-            <a:off x="889686" y="-9434"/>
+            <a:off x="889686" y="171721"/>
             <a:ext cx="7796265" cy="668462"/>
           </a:xfrm>
         </p:spPr>
@@ -10450,8 +10450,8 @@
         </p:nvSpPr>
         <p:spPr>
           <a:xfrm>
-            <a:off x="1095632" y="-9435"/>
-            <a:ext cx="7590320" cy="610797"/>
+            <a:off x="1111348" y="-9435"/>
+            <a:ext cx="7744328" cy="874143"/>
           </a:xfrm>
         </p:spPr>
         <p:txBody>
@@ -10460,22 +10460,28 @@
           <a:p>
             <a:r>
               <a:rPr lang="ru-RU" dirty="0">
-                <a:latin typeface="PT Sans" panose="020B0503020203020204" pitchFamily="34" charset="-52"/>
+                <a:latin typeface="PT Sans" panose="020B0503020203020204"/>
                 <a:ea typeface="PT Sans" panose="020B0503020203020204" pitchFamily="34" charset="-52"/>
                 <a:cs typeface="Times New Roman" panose="02020603050405020304" pitchFamily="18" charset="0"/>
               </a:rPr>
-              <a:t>Сортировка слиянием</a:t>
+              <a:t>Алгоритм</a:t>
+            </a:r>
+            <a:r>
+              <a:rPr lang="ru-RU" dirty="0">
+                <a:latin typeface="PT Sans" panose="020B0503020203020204"/>
+                <a:cs typeface="Times New Roman" panose="02020603050405020304" pitchFamily="18" charset="0"/>
+              </a:rPr>
+              <a:t> сортировки на ограниченной модели памяти для большого объема данных</a:t>
             </a:r>
             <a:endParaRPr lang="ru-RU" dirty="0">
-              <a:latin typeface="PT Sans" panose="020B0503020203020204" pitchFamily="34" charset="-52"/>
-              <a:ea typeface="PT Sans" panose="020B0503020203020204" pitchFamily="34" charset="-52"/>
+              <a:latin typeface="PT Sans" panose="020B0503020203020204"/>
             </a:endParaRPr>
           </a:p>
         </p:txBody>
       </p:sp>
       <p:sp>
         <p:nvSpPr>
-          <p:cNvPr id="9" name="Объект 2"/>
+          <p:cNvPr id="6" name="Содержимое 5"/>
           <p:cNvSpPr>
             <a:spLocks noGrp="1"/>
           </p:cNvSpPr>
@@ -10485,23 +10491,147 @@
         </p:nvSpPr>
         <p:spPr>
           <a:xfrm>
-            <a:off x="272383" y="1062499"/>
-            <a:ext cx="4143098" cy="4984074"/>
+            <a:off x="370936" y="864708"/>
+            <a:ext cx="8484740" cy="5305433"/>
           </a:xfrm>
         </p:spPr>
         <p:txBody>
-          <a:bodyPr>
-            <a:normAutofit fontScale="92500"/>
-          </a:bodyPr>
+          <a:bodyPr/>
           <a:lstStyle/>
           <a:p>
-            <a:pPr marL="514350" indent="-514350">
+            <a:pPr marL="457200" indent="-457200">
               <a:buFont typeface="+mj-lt"/>
               <a:buAutoNum type="arabicPeriod"/>
             </a:pPr>
             <a:r>
-              <a:rPr lang="ru-RU" dirty="0" smtClean="0">
-                <a:effectLst/>
+              <a:rPr lang="ru-RU" sz="2400" dirty="0" smtClean="0">
+                <a:latin typeface="PT Sans" panose="020B0503020203020204" pitchFamily="34" charset="-52"/>
+                <a:ea typeface="PT Sans" panose="020B0503020203020204" pitchFamily="34" charset="-52"/>
+                <a:cs typeface="Times New Roman" panose="02020603050405020304" pitchFamily="18" charset="0"/>
+              </a:rPr>
+              <a:t>Делим </a:t>
+            </a:r>
+            <a:r>
+              <a:rPr lang="ru-RU" sz="2400" dirty="0">
+                <a:latin typeface="PT Sans" panose="020B0503020203020204" pitchFamily="34" charset="-52"/>
+                <a:ea typeface="PT Sans" panose="020B0503020203020204" pitchFamily="34" charset="-52"/>
+                <a:cs typeface="Times New Roman" panose="02020603050405020304" pitchFamily="18" charset="0"/>
+              </a:rPr>
+              <a:t>массив на заданное количество частей;</a:t>
+            </a:r>
+          </a:p>
+          <a:p>
+            <a:pPr marL="457200" indent="-457200">
+              <a:buFont typeface="+mj-lt"/>
+              <a:buAutoNum type="arabicPeriod"/>
+            </a:pPr>
+            <a:r>
+              <a:rPr lang="ru-RU" sz="2400" dirty="0" smtClean="0">
+                <a:latin typeface="PT Sans" panose="020B0503020203020204" pitchFamily="34" charset="-52"/>
+                <a:ea typeface="PT Sans" panose="020B0503020203020204" pitchFamily="34" charset="-52"/>
+                <a:cs typeface="Times New Roman" panose="02020603050405020304" pitchFamily="18" charset="0"/>
+              </a:rPr>
+              <a:t>Сортируем </a:t>
+            </a:r>
+            <a:r>
+              <a:rPr lang="ru-RU" sz="2400" dirty="0">
+                <a:latin typeface="PT Sans" panose="020B0503020203020204" pitchFamily="34" charset="-52"/>
+                <a:ea typeface="PT Sans" panose="020B0503020203020204" pitchFamily="34" charset="-52"/>
+                <a:cs typeface="Times New Roman" panose="02020603050405020304" pitchFamily="18" charset="0"/>
+              </a:rPr>
+              <a:t>каждую часть отдельно</a:t>
+            </a:r>
+            <a:r>
+              <a:rPr lang="en-US" sz="2400" dirty="0">
+                <a:latin typeface="PT Sans" panose="020B0503020203020204" pitchFamily="34" charset="-52"/>
+                <a:ea typeface="PT Sans" panose="020B0503020203020204" pitchFamily="34" charset="-52"/>
+                <a:cs typeface="Times New Roman" panose="02020603050405020304" pitchFamily="18" charset="0"/>
+              </a:rPr>
+              <a:t>;</a:t>
+            </a:r>
+            <a:endParaRPr lang="ru-RU" sz="2400" dirty="0">
+              <a:latin typeface="PT Sans" panose="020B0503020203020204" pitchFamily="34" charset="-52"/>
+              <a:ea typeface="PT Sans" panose="020B0503020203020204" pitchFamily="34" charset="-52"/>
+              <a:cs typeface="Times New Roman" panose="02020603050405020304" pitchFamily="18" charset="0"/>
+            </a:endParaRPr>
+          </a:p>
+          <a:p>
+            <a:pPr marL="457200" indent="-457200">
+              <a:buFont typeface="+mj-lt"/>
+              <a:buAutoNum type="arabicPeriod"/>
+            </a:pPr>
+            <a:r>
+              <a:rPr lang="ru-RU" sz="2400" dirty="0" smtClean="0">
+                <a:latin typeface="PT Sans" panose="020B0503020203020204" pitchFamily="34" charset="-52"/>
+                <a:ea typeface="PT Sans" panose="020B0503020203020204" pitchFamily="34" charset="-52"/>
+                <a:cs typeface="Times New Roman" panose="02020603050405020304" pitchFamily="18" charset="0"/>
+              </a:rPr>
+              <a:t>Проверяем набор данных попарно на пересечение</a:t>
+            </a:r>
+            <a:r>
+              <a:rPr lang="en-US" sz="2400" dirty="0" smtClean="0">
+                <a:latin typeface="PT Sans" panose="020B0503020203020204" pitchFamily="34" charset="-52"/>
+                <a:ea typeface="PT Sans" panose="020B0503020203020204" pitchFamily="34" charset="-52"/>
+                <a:cs typeface="Times New Roman" panose="02020603050405020304" pitchFamily="18" charset="0"/>
+              </a:rPr>
+              <a:t> (</a:t>
+            </a:r>
+            <a:r>
+              <a:rPr lang="ru-RU" sz="2400" dirty="0" smtClean="0">
+                <a:latin typeface="PT Sans" panose="020B0503020203020204" pitchFamily="34" charset="-52"/>
+                <a:ea typeface="PT Sans" panose="020B0503020203020204" pitchFamily="34" charset="-52"/>
+                <a:cs typeface="Times New Roman" panose="02020603050405020304" pitchFamily="18" charset="0"/>
+              </a:rPr>
+              <a:t>пример пересечения</a:t>
+            </a:r>
+            <a:r>
+              <a:rPr lang="en-US" sz="2400" dirty="0" smtClean="0">
+                <a:latin typeface="PT Sans" panose="020B0503020203020204" pitchFamily="34" charset="-52"/>
+                <a:ea typeface="PT Sans" panose="020B0503020203020204" pitchFamily="34" charset="-52"/>
+                <a:cs typeface="Times New Roman" panose="02020603050405020304" pitchFamily="18" charset="0"/>
+              </a:rPr>
+              <a:t>: [1,2,3,6]</a:t>
+            </a:r>
+            <a:r>
+              <a:rPr lang="ru-RU" sz="2400" dirty="0" smtClean="0">
+                <a:latin typeface="PT Sans" panose="020B0503020203020204" pitchFamily="34" charset="-52"/>
+                <a:ea typeface="PT Sans" panose="020B0503020203020204" pitchFamily="34" charset="-52"/>
+                <a:cs typeface="Times New Roman" panose="02020603050405020304" pitchFamily="18" charset="0"/>
+              </a:rPr>
+              <a:t> и</a:t>
+            </a:r>
+            <a:r>
+              <a:rPr lang="en-US" sz="2400" dirty="0" smtClean="0">
+                <a:latin typeface="PT Sans" panose="020B0503020203020204" pitchFamily="34" charset="-52"/>
+                <a:ea typeface="PT Sans" panose="020B0503020203020204" pitchFamily="34" charset="-52"/>
+                <a:cs typeface="Times New Roman" panose="02020603050405020304" pitchFamily="18" charset="0"/>
+              </a:rPr>
+              <a:t> [4,5,7,9]</a:t>
+            </a:r>
+            <a:r>
+              <a:rPr lang="ru-RU" sz="2400" dirty="0" smtClean="0">
+                <a:latin typeface="PT Sans" panose="020B0503020203020204" pitchFamily="34" charset="-52"/>
+                <a:ea typeface="PT Sans" panose="020B0503020203020204" pitchFamily="34" charset="-52"/>
+                <a:cs typeface="Times New Roman" panose="02020603050405020304" pitchFamily="18" charset="0"/>
+              </a:rPr>
+              <a:t>)</a:t>
+            </a:r>
+            <a:r>
+              <a:rPr lang="en-US" sz="2400" dirty="0" smtClean="0">
+                <a:latin typeface="PT Sans" panose="020B0503020203020204" pitchFamily="34" charset="-52"/>
+                <a:ea typeface="PT Sans" panose="020B0503020203020204" pitchFamily="34" charset="-52"/>
+                <a:cs typeface="Times New Roman" panose="02020603050405020304" pitchFamily="18" charset="0"/>
+              </a:rPr>
+              <a:t>;</a:t>
+            </a:r>
+          </a:p>
+          <a:p>
+            <a:pPr marL="457200" indent="-457200">
+              <a:buFont typeface="+mj-lt"/>
+              <a:buAutoNum type="arabicPeriod"/>
+            </a:pPr>
+            <a:r>
+              <a:rPr lang="ru-RU" sz="2400" dirty="0" smtClean="0">
                 <a:latin typeface="PT Sans" panose="020B0503020203020204" pitchFamily="34" charset="-52"/>
                 <a:ea typeface="PT Sans" panose="020B0503020203020204" pitchFamily="34" charset="-52"/>
                 <a:cs typeface="Times New Roman" panose="02020603050405020304" pitchFamily="18" charset="0"/>
@@ -10509,131 +10639,85 @@
               <a:t>Если </a:t>
             </a:r>
             <a:r>
-              <a:rPr lang="ru-RU" dirty="0">
-                <a:effectLst/>
+              <a:rPr lang="ru-RU" sz="2400" dirty="0">
                 <a:latin typeface="PT Sans" panose="020B0503020203020204" pitchFamily="34" charset="-52"/>
                 <a:ea typeface="PT Sans" panose="020B0503020203020204" pitchFamily="34" charset="-52"/>
                 <a:cs typeface="Times New Roman" panose="02020603050405020304" pitchFamily="18" charset="0"/>
               </a:rPr>
-              <a:t>в рассматриваемом массиве </a:t>
-            </a:r>
-            <a:r>
-              <a:rPr lang="ru-RU" dirty="0" smtClean="0">
-                <a:effectLst/>
+              <a:t>наблюдается пересечения объединяем пару </a:t>
+            </a:r>
+            <a:r>
+              <a:rPr lang="ru-RU" sz="2400" dirty="0" smtClean="0">
                 <a:latin typeface="PT Sans" panose="020B0503020203020204" pitchFamily="34" charset="-52"/>
                 <a:ea typeface="PT Sans" panose="020B0503020203020204" pitchFamily="34" charset="-52"/>
                 <a:cs typeface="Times New Roman" panose="02020603050405020304" pitchFamily="18" charset="0"/>
               </a:rPr>
-              <a:t>один элемент</a:t>
-            </a:r>
-            <a:r>
-              <a:rPr lang="ru-RU" dirty="0">
-                <a:effectLst/>
+              <a:t>в массив </a:t>
+            </a:r>
+            <a:r>
+              <a:rPr lang="ru-RU" sz="2400" dirty="0">
                 <a:latin typeface="PT Sans" panose="020B0503020203020204" pitchFamily="34" charset="-52"/>
                 <a:ea typeface="PT Sans" panose="020B0503020203020204" pitchFamily="34" charset="-52"/>
                 <a:cs typeface="Times New Roman" panose="02020603050405020304" pitchFamily="18" charset="0"/>
               </a:rPr>
-              <a:t>, то он уже отсортирован — алгоритм завершает работу. </a:t>
-            </a:r>
-          </a:p>
-          <a:p>
-            <a:pPr marL="514350" indent="-514350">
-              <a:buFont typeface="+mj-lt"/>
-              <a:buAutoNum type="arabicPeriod"/>
-            </a:pPr>
-            <a:r>
-              <a:rPr lang="ru-RU" dirty="0" smtClean="0">
-                <a:effectLst/>
+              <a:t>и сортируем</a:t>
+            </a:r>
+            <a:r>
+              <a:rPr lang="en-US" sz="2400" dirty="0">
                 <a:latin typeface="PT Sans" panose="020B0503020203020204" pitchFamily="34" charset="-52"/>
                 <a:ea typeface="PT Sans" panose="020B0503020203020204" pitchFamily="34" charset="-52"/>
                 <a:cs typeface="Times New Roman" panose="02020603050405020304" pitchFamily="18" charset="0"/>
               </a:rPr>
-              <a:t>Иначе </a:t>
-            </a:r>
-            <a:r>
-              <a:rPr lang="ru-RU" dirty="0">
-                <a:effectLst/>
+              <a:t>;</a:t>
+            </a:r>
+            <a:endParaRPr lang="ru-RU" sz="2400" dirty="0">
+              <a:latin typeface="PT Sans" panose="020B0503020203020204" pitchFamily="34" charset="-52"/>
+              <a:ea typeface="PT Sans" panose="020B0503020203020204" pitchFamily="34" charset="-52"/>
+              <a:cs typeface="Times New Roman" panose="02020603050405020304" pitchFamily="18" charset="0"/>
+            </a:endParaRPr>
+          </a:p>
+          <a:p>
+            <a:pPr marL="457200" indent="-457200">
+              <a:buFont typeface="+mj-lt"/>
+              <a:buAutoNum type="arabicPeriod"/>
+            </a:pPr>
+            <a:r>
+              <a:rPr lang="ru-RU" sz="2400" dirty="0" smtClean="0">
                 <a:latin typeface="PT Sans" panose="020B0503020203020204" pitchFamily="34" charset="-52"/>
                 <a:ea typeface="PT Sans" panose="020B0503020203020204" pitchFamily="34" charset="-52"/>
                 <a:cs typeface="Times New Roman" panose="02020603050405020304" pitchFamily="18" charset="0"/>
               </a:rPr>
-              <a:t>массив разбивается на две части, которые сортируются рекурсивно. </a:t>
-            </a:r>
-          </a:p>
-          <a:p>
-            <a:pPr marL="514350" indent="-514350">
-              <a:buFont typeface="+mj-lt"/>
-              <a:buAutoNum type="arabicPeriod"/>
-            </a:pPr>
-            <a:r>
-              <a:rPr lang="ru-RU" dirty="0" smtClean="0">
-                <a:effectLst/>
+              <a:t>Разбиваем </a:t>
+            </a:r>
+            <a:r>
+              <a:rPr lang="ru-RU" sz="2400" dirty="0">
                 <a:latin typeface="PT Sans" panose="020B0503020203020204" pitchFamily="34" charset="-52"/>
                 <a:ea typeface="PT Sans" panose="020B0503020203020204" pitchFamily="34" charset="-52"/>
                 <a:cs typeface="Times New Roman" panose="02020603050405020304" pitchFamily="18" charset="0"/>
               </a:rPr>
-              <a:t>После </a:t>
-            </a:r>
-            <a:r>
-              <a:rPr lang="ru-RU" dirty="0">
-                <a:effectLst/>
+              <a:t>отсортированный массив обратно на пары и возвращаем на места</a:t>
+            </a:r>
+            <a:r>
+              <a:rPr lang="en-US" sz="2400" dirty="0">
                 <a:latin typeface="PT Sans" panose="020B0503020203020204" pitchFamily="34" charset="-52"/>
                 <a:ea typeface="PT Sans" panose="020B0503020203020204" pitchFamily="34" charset="-52"/>
                 <a:cs typeface="Times New Roman" panose="02020603050405020304" pitchFamily="18" charset="0"/>
               </a:rPr>
-              <a:t>сортировки двух частей массива к ним применяется процедура слияния, которая по двум отсортированным частям получает исходный отсортированный массив.</a:t>
-            </a:r>
-          </a:p>
-          <a:p>
-            <a:pPr marL="0" indent="0">
-              <a:buNone/>
-            </a:pPr>
-            <a:endParaRPr lang="ru-RU" dirty="0"/>
+              <a:t>;</a:t>
+            </a:r>
+            <a:endParaRPr lang="ru-RU" dirty="0">
+              <a:latin typeface="PT Sans" panose="020B0503020203020204" pitchFamily="34" charset="-52"/>
+              <a:ea typeface="PT Sans" panose="020B0503020203020204" pitchFamily="34" charset="-52"/>
+            </a:endParaRPr>
           </a:p>
         </p:txBody>
       </p:sp>
-      <p:pic>
-        <p:nvPicPr>
-          <p:cNvPr id="10" name="Picture 2" descr="https://lh5.googleusercontent.com/yhaM7XGtwtTu_so7ThuQIWZDpVVaSczAnCkB40WMr_vmDH3wOimYpnoTlXguUynSngIBdwjQsOMtcGptxAKc6dNFxnH0AhRkGqp2m2-f9pE_mWaiLt5ej4pcjHQzJYXmZoFOnDsqIcM"/>
-          <p:cNvPicPr>
-            <a:picLocks noChangeAspect="1" noChangeArrowheads="1"/>
-          </p:cNvPicPr>
-          <p:nvPr/>
-        </p:nvPicPr>
-        <p:blipFill>
-          <a:blip r:embed="rId2">
-            <a:extLst>
-              <a:ext uri="{28A0092B-C50C-407E-A947-70E740481C1C}">
-                <a14:useLocalDpi xmlns:a14="http://schemas.microsoft.com/office/drawing/2010/main" val="0"/>
-              </a:ext>
-            </a:extLst>
-          </a:blip>
-          <a:srcRect/>
-          <a:stretch>
-            <a:fillRect/>
-          </a:stretch>
-        </p:blipFill>
-        <p:spPr bwMode="auto">
-          <a:xfrm>
-            <a:off x="4555524" y="1239638"/>
-            <a:ext cx="4366636" cy="4296069"/>
-          </a:xfrm>
-          <a:prstGeom prst="rect">
-            <a:avLst/>
-          </a:prstGeom>
-          <a:noFill/>
-          <a:extLst>
-            <a:ext uri="{909E8E84-426E-40DD-AFC4-6F175D3DCCD1}">
-              <a14:hiddenFill xmlns:a14="http://schemas.microsoft.com/office/drawing/2010/main">
-                <a:solidFill>
-                  <a:srgbClr val="FFFFFF"/>
-                </a:solidFill>
-              </a14:hiddenFill>
-            </a:ext>
-          </a:extLst>
-        </p:spPr>
-      </p:pic>
     </p:spTree>
+    <p:extLst>
+      <p:ext uri="{BB962C8B-B14F-4D97-AF65-F5344CB8AC3E}">
+        <p14:creationId xmlns:p14="http://schemas.microsoft.com/office/powerpoint/2010/main" val="2739222218"/>
+      </p:ext>
+    </p:extLst>
   </p:cSld>
   <p:clrMapOvr>
     <a:masterClrMapping/>
@@ -10642,239 +10726,9 @@
   <p:timing>
     <p:tnLst>
       <p:par>
-        <p:cTn id="1" dur="indefinite" restart="never" nodeType="tmRoot">
-          <p:childTnLst>
-            <p:seq concurrent="1" nextAc="seek">
-              <p:cTn id="2" dur="indefinite" nodeType="mainSeq">
-                <p:childTnLst>
-                  <p:par>
-                    <p:cTn id="3" fill="hold">
-                      <p:stCondLst>
-                        <p:cond delay="indefinite"/>
-                        <p:cond evt="onBegin" delay="0">
-                          <p:tn val="2"/>
-                        </p:cond>
-                      </p:stCondLst>
-                      <p:childTnLst>
-                        <p:par>
-                          <p:cTn id="4" fill="hold">
-                            <p:stCondLst>
-                              <p:cond delay="0"/>
-                            </p:stCondLst>
-                            <p:childTnLst>
-                              <p:par>
-                                <p:cTn id="5" presetID="1" presetClass="entr" presetSubtype="0" fill="hold" nodeType="afterEffect">
-                                  <p:stCondLst>
-                                    <p:cond delay="0"/>
-                                  </p:stCondLst>
-                                  <p:childTnLst>
-                                    <p:set>
-                                      <p:cBhvr>
-                                        <p:cTn id="6" dur="1" fill="hold">
-                                          <p:stCondLst>
-                                            <p:cond delay="0"/>
-                                          </p:stCondLst>
-                                        </p:cTn>
-                                        <p:tgtEl>
-                                          <p:spTgt spid="10"/>
-                                        </p:tgtEl>
-                                        <p:attrNameLst>
-                                          <p:attrName>style.visibility</p:attrName>
-                                        </p:attrNameLst>
-                                      </p:cBhvr>
-                                      <p:to>
-                                        <p:strVal val="visible"/>
-                                      </p:to>
-                                    </p:set>
-                                  </p:childTnLst>
-                                </p:cTn>
-                              </p:par>
-                            </p:childTnLst>
-                          </p:cTn>
-                        </p:par>
-                        <p:par>
-                          <p:cTn id="7" fill="hold">
-                            <p:stCondLst>
-                              <p:cond delay="0"/>
-                            </p:stCondLst>
-                            <p:childTnLst>
-                              <p:par>
-                                <p:cTn id="8" presetID="10" presetClass="entr" presetSubtype="0" fill="hold" grpId="0" nodeType="afterEffect">
-                                  <p:stCondLst>
-                                    <p:cond delay="0"/>
-                                  </p:stCondLst>
-                                  <p:childTnLst>
-                                    <p:set>
-                                      <p:cBhvr>
-                                        <p:cTn id="9" dur="1" fill="hold">
-                                          <p:stCondLst>
-                                            <p:cond delay="0"/>
-                                          </p:stCondLst>
-                                        </p:cTn>
-                                        <p:tgtEl>
-                                          <p:spTgt spid="9">
-                                            <p:txEl>
-                                              <p:pRg st="0" end="0"/>
-                                            </p:txEl>
-                                          </p:spTgt>
-                                        </p:tgtEl>
-                                        <p:attrNameLst>
-                                          <p:attrName>style.visibility</p:attrName>
-                                        </p:attrNameLst>
-                                      </p:cBhvr>
-                                      <p:to>
-                                        <p:strVal val="visible"/>
-                                      </p:to>
-                                    </p:set>
-                                    <p:animEffect transition="in" filter="fade">
-                                      <p:cBhvr>
-                                        <p:cTn id="10" dur="500"/>
-                                        <p:tgtEl>
-                                          <p:spTgt spid="9">
-                                            <p:txEl>
-                                              <p:pRg st="0" end="0"/>
-                                            </p:txEl>
-                                          </p:spTgt>
-                                        </p:tgtEl>
-                                      </p:cBhvr>
-                                    </p:animEffect>
-                                  </p:childTnLst>
-                                </p:cTn>
-                              </p:par>
-                            </p:childTnLst>
-                          </p:cTn>
-                        </p:par>
-                        <p:par>
-                          <p:cTn id="11" fill="hold">
-                            <p:stCondLst>
-                              <p:cond delay="500"/>
-                            </p:stCondLst>
-                            <p:childTnLst>
-                              <p:par>
-                                <p:cTn id="12" presetID="10" presetClass="entr" presetSubtype="0" fill="hold" grpId="0" nodeType="afterEffect">
-                                  <p:stCondLst>
-                                    <p:cond delay="0"/>
-                                  </p:stCondLst>
-                                  <p:childTnLst>
-                                    <p:set>
-                                      <p:cBhvr>
-                                        <p:cTn id="13" dur="1" fill="hold">
-                                          <p:stCondLst>
-                                            <p:cond delay="0"/>
-                                          </p:stCondLst>
-                                        </p:cTn>
-                                        <p:tgtEl>
-                                          <p:spTgt spid="9">
-                                            <p:txEl>
-                                              <p:pRg st="1" end="1"/>
-                                            </p:txEl>
-                                          </p:spTgt>
-                                        </p:tgtEl>
-                                        <p:attrNameLst>
-                                          <p:attrName>style.visibility</p:attrName>
-                                        </p:attrNameLst>
-                                      </p:cBhvr>
-                                      <p:to>
-                                        <p:strVal val="visible"/>
-                                      </p:to>
-                                    </p:set>
-                                    <p:animEffect transition="in" filter="fade">
-                                      <p:cBhvr>
-                                        <p:cTn id="14" dur="500"/>
-                                        <p:tgtEl>
-                                          <p:spTgt spid="9">
-                                            <p:txEl>
-                                              <p:pRg st="1" end="1"/>
-                                            </p:txEl>
-                                          </p:spTgt>
-                                        </p:tgtEl>
-                                      </p:cBhvr>
-                                    </p:animEffect>
-                                  </p:childTnLst>
-                                </p:cTn>
-                              </p:par>
-                            </p:childTnLst>
-                          </p:cTn>
-                        </p:par>
-                        <p:par>
-                          <p:cTn id="15" fill="hold">
-                            <p:stCondLst>
-                              <p:cond delay="1000"/>
-                            </p:stCondLst>
-                            <p:childTnLst>
-                              <p:par>
-                                <p:cTn id="16" presetID="10" presetClass="entr" presetSubtype="0" fill="hold" grpId="0" nodeType="afterEffect">
-                                  <p:stCondLst>
-                                    <p:cond delay="0"/>
-                                  </p:stCondLst>
-                                  <p:childTnLst>
-                                    <p:set>
-                                      <p:cBhvr>
-                                        <p:cTn id="17" dur="1" fill="hold">
-                                          <p:stCondLst>
-                                            <p:cond delay="0"/>
-                                          </p:stCondLst>
-                                        </p:cTn>
-                                        <p:tgtEl>
-                                          <p:spTgt spid="9">
-                                            <p:txEl>
-                                              <p:pRg st="2" end="2"/>
-                                            </p:txEl>
-                                          </p:spTgt>
-                                        </p:tgtEl>
-                                        <p:attrNameLst>
-                                          <p:attrName>style.visibility</p:attrName>
-                                        </p:attrNameLst>
-                                      </p:cBhvr>
-                                      <p:to>
-                                        <p:strVal val="visible"/>
-                                      </p:to>
-                                    </p:set>
-                                    <p:animEffect transition="in" filter="fade">
-                                      <p:cBhvr>
-                                        <p:cTn id="18" dur="500"/>
-                                        <p:tgtEl>
-                                          <p:spTgt spid="9">
-                                            <p:txEl>
-                                              <p:pRg st="2" end="2"/>
-                                            </p:txEl>
-                                          </p:spTgt>
-                                        </p:tgtEl>
-                                      </p:cBhvr>
-                                    </p:animEffect>
-                                  </p:childTnLst>
-                                </p:cTn>
-                              </p:par>
-                            </p:childTnLst>
-                          </p:cTn>
-                        </p:par>
-                      </p:childTnLst>
-                    </p:cTn>
-                  </p:par>
-                </p:childTnLst>
-              </p:cTn>
-              <p:prevCondLst>
-                <p:cond evt="onPrev" delay="0">
-                  <p:tgtEl>
-                    <p:sldTgt/>
-                  </p:tgtEl>
-                </p:cond>
-              </p:prevCondLst>
-              <p:nextCondLst>
-                <p:cond evt="onNext" delay="0">
-                  <p:tgtEl>
-                    <p:sldTgt/>
-                  </p:tgtEl>
-                </p:cond>
-              </p:nextCondLst>
-            </p:seq>
-          </p:childTnLst>
-        </p:cTn>
+        <p:cTn id="1" dur="indefinite" restart="never" nodeType="tmRoot"/>
       </p:par>
     </p:tnLst>
-    <p:bldLst>
-      <p:bldP spid="9" grpId="0" build="p"/>
-    </p:bldLst>
   </p:timing>
 </p:sld>
 </file>
@@ -10908,1164 +10762,7 @@
         </p:nvSpPr>
         <p:spPr>
           <a:xfrm>
-            <a:off x="928468" y="-9435"/>
-            <a:ext cx="7757483" cy="701413"/>
-          </a:xfrm>
-        </p:spPr>
-        <p:txBody>
-          <a:bodyPr/>
-          <a:lstStyle/>
-          <a:p>
-            <a:r>
-              <a:rPr lang="ru-RU" dirty="0" smtClean="0"/>
-              <a:t>Пирамидальная сортировка</a:t>
-            </a:r>
-            <a:endParaRPr lang="en-US" dirty="0" smtClean="0"/>
-          </a:p>
-        </p:txBody>
-      </p:sp>
-      <p:sp>
-        <p:nvSpPr>
-          <p:cNvPr id="6" name="Содержимое 5"/>
-          <p:cNvSpPr>
-            <a:spLocks noGrp="1"/>
-          </p:cNvSpPr>
-          <p:nvPr>
-            <p:ph idx="1"/>
-          </p:nvPr>
-        </p:nvSpPr>
-        <p:spPr>
-          <a:xfrm>
-            <a:off x="399046" y="1311241"/>
-            <a:ext cx="6677257" cy="1590456"/>
-          </a:xfrm>
-        </p:spPr>
-        <p:txBody>
-          <a:bodyPr/>
-          <a:lstStyle/>
-          <a:p>
-            <a:pPr marL="0" indent="0">
-              <a:buNone/>
-            </a:pPr>
-            <a:r>
-              <a:rPr lang="en-US" dirty="0" smtClean="0"/>
-              <a:t> </a:t>
-            </a:r>
-            <a:r>
-              <a:rPr lang="ru-RU" dirty="0">
-                <a:latin typeface="Times New Roman" panose="02020603050405020304" pitchFamily="18" charset="0"/>
-                <a:cs typeface="Times New Roman" panose="02020603050405020304" pitchFamily="18" charset="0"/>
-              </a:rPr>
-              <a:t>Пирамидальная сортировка состоит из 2 шагов:</a:t>
-            </a:r>
-          </a:p>
-          <a:p>
-            <a:pPr marL="514350" indent="-514350">
-              <a:buFont typeface="+mj-lt"/>
-              <a:buAutoNum type="arabicPeriod"/>
-            </a:pPr>
-            <a:r>
-              <a:rPr lang="ru-RU" dirty="0" smtClean="0">
-                <a:latin typeface="Times New Roman" panose="02020603050405020304" pitchFamily="18" charset="0"/>
-                <a:cs typeface="Times New Roman" panose="02020603050405020304" pitchFamily="18" charset="0"/>
-              </a:rPr>
-              <a:t> </a:t>
-            </a:r>
-            <a:r>
-              <a:rPr lang="ru-RU" dirty="0">
-                <a:latin typeface="Times New Roman" panose="02020603050405020304" pitchFamily="18" charset="0"/>
-                <a:cs typeface="Times New Roman" panose="02020603050405020304" pitchFamily="18" charset="0"/>
-              </a:rPr>
-              <a:t>Построение пирамиды;</a:t>
-            </a:r>
-          </a:p>
-          <a:p>
-            <a:pPr marL="514350" indent="-514350">
-              <a:buFont typeface="+mj-lt"/>
-              <a:buAutoNum type="arabicPeriod"/>
-            </a:pPr>
-            <a:r>
-              <a:rPr lang="ru-RU" dirty="0" smtClean="0">
-                <a:latin typeface="Times New Roman" panose="02020603050405020304" pitchFamily="18" charset="0"/>
-                <a:cs typeface="Times New Roman" panose="02020603050405020304" pitchFamily="18" charset="0"/>
-              </a:rPr>
-              <a:t> </a:t>
-            </a:r>
-            <a:r>
-              <a:rPr lang="ru-RU" dirty="0">
-                <a:latin typeface="Times New Roman" panose="02020603050405020304" pitchFamily="18" charset="0"/>
-                <a:cs typeface="Times New Roman" panose="02020603050405020304" pitchFamily="18" charset="0"/>
-              </a:rPr>
-              <a:t>Сортировка;</a:t>
-            </a:r>
-          </a:p>
-          <a:p>
-            <a:pPr marL="485673" lvl="1" indent="0">
-              <a:buNone/>
-            </a:pPr>
-            <a:endParaRPr lang="en-US" dirty="0" smtClean="0"/>
-          </a:p>
-          <a:p>
-            <a:pPr marL="485673" lvl="1" indent="0">
-              <a:buNone/>
-            </a:pPr>
-            <a:r>
-              <a:rPr lang="en-US" dirty="0" smtClean="0"/>
-              <a:t> </a:t>
-            </a:r>
-            <a:endParaRPr lang="ru-RU" dirty="0"/>
-          </a:p>
-        </p:txBody>
-      </p:sp>
-      <p:pic>
-        <p:nvPicPr>
-          <p:cNvPr id="4" name="Picture 2" descr="https://lh4.googleusercontent.com/ajviGg6hOnUrVbtkkDJdr0X7SD3FPK4c4JC1z0eLaoUecJBwTr5py64tth-6PvxFWr6GDmPpAyUn7-IK1dKk7J7984kRaXHyiLeNMQVI_RRDKCxkd3D5pmugMxcNVa7MHyttYlj_cjw"/>
-          <p:cNvPicPr>
-            <a:picLocks noChangeAspect="1" noChangeArrowheads="1"/>
-          </p:cNvPicPr>
-          <p:nvPr/>
-        </p:nvPicPr>
-        <p:blipFill>
-          <a:blip r:embed="rId2">
-            <a:extLst>
-              <a:ext uri="{28A0092B-C50C-407E-A947-70E740481C1C}">
-                <a14:useLocalDpi xmlns:a14="http://schemas.microsoft.com/office/drawing/2010/main" val="0"/>
-              </a:ext>
-            </a:extLst>
-          </a:blip>
-          <a:srcRect/>
-          <a:stretch>
-            <a:fillRect/>
-          </a:stretch>
-        </p:blipFill>
-        <p:spPr bwMode="auto">
-          <a:xfrm>
-            <a:off x="399046" y="2847203"/>
-            <a:ext cx="2023200" cy="1431509"/>
-          </a:xfrm>
-          <a:prstGeom prst="rect">
-            <a:avLst/>
-          </a:prstGeom>
-          <a:noFill/>
-          <a:extLst>
-            <a:ext uri="{909E8E84-426E-40DD-AFC4-6F175D3DCCD1}">
-              <a14:hiddenFill xmlns:a14="http://schemas.microsoft.com/office/drawing/2010/main">
-                <a:solidFill>
-                  <a:srgbClr val="FFFFFF"/>
-                </a:solidFill>
-              </a14:hiddenFill>
-            </a:ext>
-          </a:extLst>
-        </p:spPr>
-      </p:pic>
-      <p:pic>
-        <p:nvPicPr>
-          <p:cNvPr id="5" name="Picture 4" descr="https://lh4.googleusercontent.com/qminm2MhomMgRmwyaVeT5HPDz37brrW3NhREoITWNBGnqCKq_MImla3vlmmqkgz23Jo8ScyNqrpa0VTCKwCV4LQzp7FHsTD5vF12A7_v44ipZeRYdgYMSpWVWwBKwphcYS4-DneHyZw"/>
-          <p:cNvPicPr>
-            <a:picLocks noChangeAspect="1" noChangeArrowheads="1"/>
-          </p:cNvPicPr>
-          <p:nvPr/>
-        </p:nvPicPr>
-        <p:blipFill>
-          <a:blip r:embed="rId3">
-            <a:extLst>
-              <a:ext uri="{28A0092B-C50C-407E-A947-70E740481C1C}">
-                <a14:useLocalDpi xmlns:a14="http://schemas.microsoft.com/office/drawing/2010/main" val="0"/>
-              </a:ext>
-            </a:extLst>
-          </a:blip>
-          <a:srcRect/>
-          <a:stretch>
-            <a:fillRect/>
-          </a:stretch>
-        </p:blipFill>
-        <p:spPr bwMode="auto">
-          <a:xfrm>
-            <a:off x="2509824" y="2847203"/>
-            <a:ext cx="2021651" cy="1407600"/>
-          </a:xfrm>
-          <a:prstGeom prst="rect">
-            <a:avLst/>
-          </a:prstGeom>
-          <a:noFill/>
-          <a:extLst>
-            <a:ext uri="{909E8E84-426E-40DD-AFC4-6F175D3DCCD1}">
-              <a14:hiddenFill xmlns:a14="http://schemas.microsoft.com/office/drawing/2010/main">
-                <a:solidFill>
-                  <a:srgbClr val="FFFFFF"/>
-                </a:solidFill>
-              </a14:hiddenFill>
-            </a:ext>
-          </a:extLst>
-        </p:spPr>
-      </p:pic>
-      <p:pic>
-        <p:nvPicPr>
-          <p:cNvPr id="7" name="Picture 6" descr="https://lh5.googleusercontent.com/xeoNsRWdryhGpSFFxmCIpn0_SYrTlRqJnxrXTpYHVVjWFgLR5rfJL6KK3TBZ9cRD35Xt87pe-izFGjg2xqCWGAw939HGOaOwYBR_A_uwCXXKzInOT1mdGU9VTPGPgb5CYkbjNfeiTZc"/>
-          <p:cNvPicPr>
-            <a:picLocks noChangeAspect="1" noChangeArrowheads="1"/>
-          </p:cNvPicPr>
-          <p:nvPr/>
-        </p:nvPicPr>
-        <p:blipFill>
-          <a:blip r:embed="rId4">
-            <a:extLst>
-              <a:ext uri="{28A0092B-C50C-407E-A947-70E740481C1C}">
-                <a14:useLocalDpi xmlns:a14="http://schemas.microsoft.com/office/drawing/2010/main" val="0"/>
-              </a:ext>
-            </a:extLst>
-          </a:blip>
-          <a:srcRect/>
-          <a:stretch>
-            <a:fillRect/>
-          </a:stretch>
-        </p:blipFill>
-        <p:spPr bwMode="auto">
-          <a:xfrm>
-            <a:off x="4619053" y="2847203"/>
-            <a:ext cx="2023200" cy="1407406"/>
-          </a:xfrm>
-          <a:prstGeom prst="rect">
-            <a:avLst/>
-          </a:prstGeom>
-          <a:noFill/>
-          <a:extLst>
-            <a:ext uri="{909E8E84-426E-40DD-AFC4-6F175D3DCCD1}">
-              <a14:hiddenFill xmlns:a14="http://schemas.microsoft.com/office/drawing/2010/main">
-                <a:solidFill>
-                  <a:srgbClr val="FFFFFF"/>
-                </a:solidFill>
-              </a14:hiddenFill>
-            </a:ext>
-          </a:extLst>
-        </p:spPr>
-      </p:pic>
-      <p:pic>
-        <p:nvPicPr>
-          <p:cNvPr id="8" name="Picture 8" descr="https://lh6.googleusercontent.com/NLT8lPoKqrqe30XC-pVeKaSNLBn34RIWj7PL_2IPdmnYH8OtV1NjDOoCm_WpMCtK0kfcdFlSV7dkBIMtvDiAcKgGwEKYc2iuk3fZwiV25g9zbLRcGWeQch_9ih6vlIQhMBBOsfgz1pg"/>
-          <p:cNvPicPr>
-            <a:picLocks noChangeAspect="1" noChangeArrowheads="1"/>
-          </p:cNvPicPr>
-          <p:nvPr/>
-        </p:nvPicPr>
-        <p:blipFill>
-          <a:blip r:embed="rId5">
-            <a:extLst>
-              <a:ext uri="{28A0092B-C50C-407E-A947-70E740481C1C}">
-                <a14:useLocalDpi xmlns:a14="http://schemas.microsoft.com/office/drawing/2010/main" val="0"/>
-              </a:ext>
-            </a:extLst>
-          </a:blip>
-          <a:srcRect/>
-          <a:stretch>
-            <a:fillRect/>
-          </a:stretch>
-        </p:blipFill>
-        <p:spPr bwMode="auto">
-          <a:xfrm>
-            <a:off x="6724305" y="2847203"/>
-            <a:ext cx="2023200" cy="1407406"/>
-          </a:xfrm>
-          <a:prstGeom prst="rect">
-            <a:avLst/>
-          </a:prstGeom>
-          <a:noFill/>
-          <a:extLst>
-            <a:ext uri="{909E8E84-426E-40DD-AFC4-6F175D3DCCD1}">
-              <a14:hiddenFill xmlns:a14="http://schemas.microsoft.com/office/drawing/2010/main">
-                <a:solidFill>
-                  <a:srgbClr val="FFFFFF"/>
-                </a:solidFill>
-              </a14:hiddenFill>
-            </a:ext>
-          </a:extLst>
-        </p:spPr>
-      </p:pic>
-      <p:pic>
-        <p:nvPicPr>
-          <p:cNvPr id="9" name="Picture 10" descr="https://lh5.googleusercontent.com/kDb6QncAhav-_weJZAFGD4_7Xm6OzaSSfYWjIcjTqq_wUOCC4BO9QZ_3AkDNtiVTCVXb_jISA8wFQgMVJ2gP2B8ti5mjpLz1nWR0BB846EUufYViUwp-BikqDmKjFqt0zPOfqltV1q8"/>
-          <p:cNvPicPr>
-            <a:picLocks noChangeAspect="1" noChangeArrowheads="1"/>
-          </p:cNvPicPr>
-          <p:nvPr/>
-        </p:nvPicPr>
-        <p:blipFill>
-          <a:blip r:embed="rId6">
-            <a:extLst>
-              <a:ext uri="{28A0092B-C50C-407E-A947-70E740481C1C}">
-                <a14:useLocalDpi xmlns:a14="http://schemas.microsoft.com/office/drawing/2010/main" val="0"/>
-              </a:ext>
-            </a:extLst>
-          </a:blip>
-          <a:srcRect/>
-          <a:stretch>
-            <a:fillRect/>
-          </a:stretch>
-        </p:blipFill>
-        <p:spPr bwMode="auto">
-          <a:xfrm>
-            <a:off x="422990" y="4462052"/>
-            <a:ext cx="2023200" cy="1396292"/>
-          </a:xfrm>
-          <a:prstGeom prst="rect">
-            <a:avLst/>
-          </a:prstGeom>
-          <a:noFill/>
-          <a:extLst>
-            <a:ext uri="{909E8E84-426E-40DD-AFC4-6F175D3DCCD1}">
-              <a14:hiddenFill xmlns:a14="http://schemas.microsoft.com/office/drawing/2010/main">
-                <a:solidFill>
-                  <a:srgbClr val="FFFFFF"/>
-                </a:solidFill>
-              </a14:hiddenFill>
-            </a:ext>
-          </a:extLst>
-        </p:spPr>
-      </p:pic>
-      <p:pic>
-        <p:nvPicPr>
-          <p:cNvPr id="10" name="Рисунок 9"/>
-          <p:cNvPicPr>
-            <a:picLocks noChangeAspect="1"/>
-          </p:cNvPicPr>
-          <p:nvPr/>
-        </p:nvPicPr>
-        <p:blipFill>
-          <a:blip r:embed="rId7">
-            <a:extLst>
-              <a:ext uri="{28A0092B-C50C-407E-A947-70E740481C1C}">
-                <a14:useLocalDpi xmlns:a14="http://schemas.microsoft.com/office/drawing/2010/main" val="0"/>
-              </a:ext>
-            </a:extLst>
-          </a:blip>
-          <a:stretch>
-            <a:fillRect/>
-          </a:stretch>
-        </p:blipFill>
-        <p:spPr>
-          <a:xfrm>
-            <a:off x="2508275" y="4462052"/>
-            <a:ext cx="2023200" cy="1402124"/>
-          </a:xfrm>
-          <a:prstGeom prst="rect">
-            <a:avLst/>
-          </a:prstGeom>
-        </p:spPr>
-      </p:pic>
-      <p:pic>
-        <p:nvPicPr>
-          <p:cNvPr id="11" name="Picture 12" descr="https://lh3.googleusercontent.com/yjpM9kUMrM-wfVC2OyOMyrBNt59EoQn_mwhD1ehl-TpfdhFT-NK3GAmSMkMLYeiW25-UaUBonacJ6kT5F7SQvTbAKZqtzGV8_QWuqftqjPTmwTJShXUZ7pX5QLAqT5jKOeYfJmCwZSs"/>
-          <p:cNvPicPr>
-            <a:picLocks noChangeAspect="1" noChangeArrowheads="1"/>
-          </p:cNvPicPr>
-          <p:nvPr/>
-        </p:nvPicPr>
-        <p:blipFill>
-          <a:blip r:embed="rId8">
-            <a:extLst>
-              <a:ext uri="{28A0092B-C50C-407E-A947-70E740481C1C}">
-                <a14:useLocalDpi xmlns:a14="http://schemas.microsoft.com/office/drawing/2010/main" val="0"/>
-              </a:ext>
-            </a:extLst>
-          </a:blip>
-          <a:srcRect/>
-          <a:stretch>
-            <a:fillRect/>
-          </a:stretch>
-        </p:blipFill>
-        <p:spPr bwMode="auto">
-          <a:xfrm>
-            <a:off x="4619053" y="4462052"/>
-            <a:ext cx="2023200" cy="1367798"/>
-          </a:xfrm>
-          <a:prstGeom prst="rect">
-            <a:avLst/>
-          </a:prstGeom>
-          <a:noFill/>
-          <a:extLst>
-            <a:ext uri="{909E8E84-426E-40DD-AFC4-6F175D3DCCD1}">
-              <a14:hiddenFill xmlns:a14="http://schemas.microsoft.com/office/drawing/2010/main">
-                <a:solidFill>
-                  <a:srgbClr val="FFFFFF"/>
-                </a:solidFill>
-              </a14:hiddenFill>
-            </a:ext>
-          </a:extLst>
-        </p:spPr>
-      </p:pic>
-      <p:pic>
-        <p:nvPicPr>
-          <p:cNvPr id="12" name="Picture 14" descr="https://lh4.googleusercontent.com/Bh_38uNSPcPEiNtHL0AuVoJhb7iEIEOuadW4sW6olx3Gn17EvIz75uEGzcQCX3PtPeagAGimQqV35H3x3cPBkdd3ZjzefDDyMKpt9g7fnYPkWnTiIj_jiIdBhZzBYcN3HejY3UU1U0o"/>
-          <p:cNvPicPr>
-            <a:picLocks noChangeAspect="1" noChangeArrowheads="1"/>
-          </p:cNvPicPr>
-          <p:nvPr/>
-        </p:nvPicPr>
-        <p:blipFill>
-          <a:blip r:embed="rId9">
-            <a:extLst>
-              <a:ext uri="{28A0092B-C50C-407E-A947-70E740481C1C}">
-                <a14:useLocalDpi xmlns:a14="http://schemas.microsoft.com/office/drawing/2010/main" val="0"/>
-              </a:ext>
-            </a:extLst>
-          </a:blip>
-          <a:srcRect/>
-          <a:stretch>
-            <a:fillRect/>
-          </a:stretch>
-        </p:blipFill>
-        <p:spPr bwMode="auto">
-          <a:xfrm>
-            <a:off x="6744711" y="4462052"/>
-            <a:ext cx="2023200" cy="1340336"/>
-          </a:xfrm>
-          <a:prstGeom prst="rect">
-            <a:avLst/>
-          </a:prstGeom>
-          <a:noFill/>
-          <a:extLst>
-            <a:ext uri="{909E8E84-426E-40DD-AFC4-6F175D3DCCD1}">
-              <a14:hiddenFill xmlns:a14="http://schemas.microsoft.com/office/drawing/2010/main">
-                <a:solidFill>
-                  <a:srgbClr val="FFFFFF"/>
-                </a:solidFill>
-              </a14:hiddenFill>
-            </a:ext>
-          </a:extLst>
-        </p:spPr>
-      </p:pic>
-    </p:spTree>
-    <p:extLst>
-      <p:ext uri="{BB962C8B-B14F-4D97-AF65-F5344CB8AC3E}">
-        <p14:creationId xmlns:p14="http://schemas.microsoft.com/office/powerpoint/2010/main" val="2490644639"/>
-      </p:ext>
-    </p:extLst>
-  </p:cSld>
-  <p:clrMapOvr>
-    <a:masterClrMapping/>
-  </p:clrMapOvr>
-  <p:transition spd="med" advTm="8000"/>
-  <p:timing>
-    <p:tnLst>
-      <p:par>
-        <p:cTn id="1" dur="indefinite" restart="never" nodeType="tmRoot">
-          <p:childTnLst>
-            <p:seq concurrent="1" nextAc="seek">
-              <p:cTn id="2" dur="indefinite" nodeType="mainSeq">
-                <p:childTnLst>
-                  <p:par>
-                    <p:cTn id="3" fill="hold">
-                      <p:stCondLst>
-                        <p:cond delay="indefinite"/>
-                        <p:cond evt="onBegin" delay="0">
-                          <p:tn val="2"/>
-                        </p:cond>
-                      </p:stCondLst>
-                      <p:childTnLst>
-                        <p:par>
-                          <p:cTn id="4" fill="hold">
-                            <p:stCondLst>
-                              <p:cond delay="0"/>
-                            </p:stCondLst>
-                            <p:childTnLst>
-                              <p:par>
-                                <p:cTn id="5" presetID="10" presetClass="entr" presetSubtype="0" fill="hold" nodeType="afterEffect">
-                                  <p:stCondLst>
-                                    <p:cond delay="0"/>
-                                  </p:stCondLst>
-                                  <p:childTnLst>
-                                    <p:set>
-                                      <p:cBhvr>
-                                        <p:cTn id="6" dur="1" fill="hold">
-                                          <p:stCondLst>
-                                            <p:cond delay="0"/>
-                                          </p:stCondLst>
-                                        </p:cTn>
-                                        <p:tgtEl>
-                                          <p:spTgt spid="4"/>
-                                        </p:tgtEl>
-                                        <p:attrNameLst>
-                                          <p:attrName>style.visibility</p:attrName>
-                                        </p:attrNameLst>
-                                      </p:cBhvr>
-                                      <p:to>
-                                        <p:strVal val="visible"/>
-                                      </p:to>
-                                    </p:set>
-                                    <p:animEffect transition="in" filter="fade">
-                                      <p:cBhvr>
-                                        <p:cTn id="7" dur="500"/>
-                                        <p:tgtEl>
-                                          <p:spTgt spid="4"/>
-                                        </p:tgtEl>
-                                      </p:cBhvr>
-                                    </p:animEffect>
-                                  </p:childTnLst>
-                                </p:cTn>
-                              </p:par>
-                            </p:childTnLst>
-                          </p:cTn>
-                        </p:par>
-                        <p:par>
-                          <p:cTn id="8" fill="hold">
-                            <p:stCondLst>
-                              <p:cond delay="500"/>
-                            </p:stCondLst>
-                            <p:childTnLst>
-                              <p:par>
-                                <p:cTn id="9" presetID="10" presetClass="entr" presetSubtype="0" fill="hold" nodeType="afterEffect">
-                                  <p:stCondLst>
-                                    <p:cond delay="0"/>
-                                  </p:stCondLst>
-                                  <p:childTnLst>
-                                    <p:set>
-                                      <p:cBhvr>
-                                        <p:cTn id="10" dur="1" fill="hold">
-                                          <p:stCondLst>
-                                            <p:cond delay="0"/>
-                                          </p:stCondLst>
-                                        </p:cTn>
-                                        <p:tgtEl>
-                                          <p:spTgt spid="5"/>
-                                        </p:tgtEl>
-                                        <p:attrNameLst>
-                                          <p:attrName>style.visibility</p:attrName>
-                                        </p:attrNameLst>
-                                      </p:cBhvr>
-                                      <p:to>
-                                        <p:strVal val="visible"/>
-                                      </p:to>
-                                    </p:set>
-                                    <p:animEffect transition="in" filter="fade">
-                                      <p:cBhvr>
-                                        <p:cTn id="11" dur="500"/>
-                                        <p:tgtEl>
-                                          <p:spTgt spid="5"/>
-                                        </p:tgtEl>
-                                      </p:cBhvr>
-                                    </p:animEffect>
-                                  </p:childTnLst>
-                                </p:cTn>
-                              </p:par>
-                            </p:childTnLst>
-                          </p:cTn>
-                        </p:par>
-                        <p:par>
-                          <p:cTn id="12" fill="hold">
-                            <p:stCondLst>
-                              <p:cond delay="1000"/>
-                            </p:stCondLst>
-                            <p:childTnLst>
-                              <p:par>
-                                <p:cTn id="13" presetID="10" presetClass="entr" presetSubtype="0" fill="hold" nodeType="afterEffect">
-                                  <p:stCondLst>
-                                    <p:cond delay="0"/>
-                                  </p:stCondLst>
-                                  <p:childTnLst>
-                                    <p:set>
-                                      <p:cBhvr>
-                                        <p:cTn id="14" dur="1" fill="hold">
-                                          <p:stCondLst>
-                                            <p:cond delay="0"/>
-                                          </p:stCondLst>
-                                        </p:cTn>
-                                        <p:tgtEl>
-                                          <p:spTgt spid="7"/>
-                                        </p:tgtEl>
-                                        <p:attrNameLst>
-                                          <p:attrName>style.visibility</p:attrName>
-                                        </p:attrNameLst>
-                                      </p:cBhvr>
-                                      <p:to>
-                                        <p:strVal val="visible"/>
-                                      </p:to>
-                                    </p:set>
-                                    <p:animEffect transition="in" filter="fade">
-                                      <p:cBhvr>
-                                        <p:cTn id="15" dur="500"/>
-                                        <p:tgtEl>
-                                          <p:spTgt spid="7"/>
-                                        </p:tgtEl>
-                                      </p:cBhvr>
-                                    </p:animEffect>
-                                  </p:childTnLst>
-                                </p:cTn>
-                              </p:par>
-                            </p:childTnLst>
-                          </p:cTn>
-                        </p:par>
-                        <p:par>
-                          <p:cTn id="16" fill="hold">
-                            <p:stCondLst>
-                              <p:cond delay="1500"/>
-                            </p:stCondLst>
-                            <p:childTnLst>
-                              <p:par>
-                                <p:cTn id="17" presetID="10" presetClass="entr" presetSubtype="0" fill="hold" nodeType="afterEffect">
-                                  <p:stCondLst>
-                                    <p:cond delay="0"/>
-                                  </p:stCondLst>
-                                  <p:childTnLst>
-                                    <p:set>
-                                      <p:cBhvr>
-                                        <p:cTn id="18" dur="1" fill="hold">
-                                          <p:stCondLst>
-                                            <p:cond delay="0"/>
-                                          </p:stCondLst>
-                                        </p:cTn>
-                                        <p:tgtEl>
-                                          <p:spTgt spid="8"/>
-                                        </p:tgtEl>
-                                        <p:attrNameLst>
-                                          <p:attrName>style.visibility</p:attrName>
-                                        </p:attrNameLst>
-                                      </p:cBhvr>
-                                      <p:to>
-                                        <p:strVal val="visible"/>
-                                      </p:to>
-                                    </p:set>
-                                    <p:animEffect transition="in" filter="fade">
-                                      <p:cBhvr>
-                                        <p:cTn id="19" dur="500"/>
-                                        <p:tgtEl>
-                                          <p:spTgt spid="8"/>
-                                        </p:tgtEl>
-                                      </p:cBhvr>
-                                    </p:animEffect>
-                                  </p:childTnLst>
-                                </p:cTn>
-                              </p:par>
-                            </p:childTnLst>
-                          </p:cTn>
-                        </p:par>
-                        <p:par>
-                          <p:cTn id="20" fill="hold">
-                            <p:stCondLst>
-                              <p:cond delay="2000"/>
-                            </p:stCondLst>
-                            <p:childTnLst>
-                              <p:par>
-                                <p:cTn id="21" presetID="10" presetClass="entr" presetSubtype="0" fill="hold" nodeType="afterEffect">
-                                  <p:stCondLst>
-                                    <p:cond delay="0"/>
-                                  </p:stCondLst>
-                                  <p:childTnLst>
-                                    <p:set>
-                                      <p:cBhvr>
-                                        <p:cTn id="22" dur="1" fill="hold">
-                                          <p:stCondLst>
-                                            <p:cond delay="0"/>
-                                          </p:stCondLst>
-                                        </p:cTn>
-                                        <p:tgtEl>
-                                          <p:spTgt spid="9"/>
-                                        </p:tgtEl>
-                                        <p:attrNameLst>
-                                          <p:attrName>style.visibility</p:attrName>
-                                        </p:attrNameLst>
-                                      </p:cBhvr>
-                                      <p:to>
-                                        <p:strVal val="visible"/>
-                                      </p:to>
-                                    </p:set>
-                                    <p:animEffect transition="in" filter="fade">
-                                      <p:cBhvr>
-                                        <p:cTn id="23" dur="500"/>
-                                        <p:tgtEl>
-                                          <p:spTgt spid="9"/>
-                                        </p:tgtEl>
-                                      </p:cBhvr>
-                                    </p:animEffect>
-                                  </p:childTnLst>
-                                </p:cTn>
-                              </p:par>
-                            </p:childTnLst>
-                          </p:cTn>
-                        </p:par>
-                        <p:par>
-                          <p:cTn id="24" fill="hold">
-                            <p:stCondLst>
-                              <p:cond delay="2500"/>
-                            </p:stCondLst>
-                            <p:childTnLst>
-                              <p:par>
-                                <p:cTn id="25" presetID="10" presetClass="entr" presetSubtype="0" fill="hold" nodeType="afterEffect">
-                                  <p:stCondLst>
-                                    <p:cond delay="0"/>
-                                  </p:stCondLst>
-                                  <p:childTnLst>
-                                    <p:set>
-                                      <p:cBhvr>
-                                        <p:cTn id="26" dur="1" fill="hold">
-                                          <p:stCondLst>
-                                            <p:cond delay="0"/>
-                                          </p:stCondLst>
-                                        </p:cTn>
-                                        <p:tgtEl>
-                                          <p:spTgt spid="10"/>
-                                        </p:tgtEl>
-                                        <p:attrNameLst>
-                                          <p:attrName>style.visibility</p:attrName>
-                                        </p:attrNameLst>
-                                      </p:cBhvr>
-                                      <p:to>
-                                        <p:strVal val="visible"/>
-                                      </p:to>
-                                    </p:set>
-                                    <p:animEffect transition="in" filter="fade">
-                                      <p:cBhvr>
-                                        <p:cTn id="27" dur="500"/>
-                                        <p:tgtEl>
-                                          <p:spTgt spid="10"/>
-                                        </p:tgtEl>
-                                      </p:cBhvr>
-                                    </p:animEffect>
-                                  </p:childTnLst>
-                                </p:cTn>
-                              </p:par>
-                            </p:childTnLst>
-                          </p:cTn>
-                        </p:par>
-                        <p:par>
-                          <p:cTn id="28" fill="hold">
-                            <p:stCondLst>
-                              <p:cond delay="3000"/>
-                            </p:stCondLst>
-                            <p:childTnLst>
-                              <p:par>
-                                <p:cTn id="29" presetID="10" presetClass="entr" presetSubtype="0" fill="hold" nodeType="afterEffect">
-                                  <p:stCondLst>
-                                    <p:cond delay="0"/>
-                                  </p:stCondLst>
-                                  <p:childTnLst>
-                                    <p:set>
-                                      <p:cBhvr>
-                                        <p:cTn id="30" dur="1" fill="hold">
-                                          <p:stCondLst>
-                                            <p:cond delay="0"/>
-                                          </p:stCondLst>
-                                        </p:cTn>
-                                        <p:tgtEl>
-                                          <p:spTgt spid="11"/>
-                                        </p:tgtEl>
-                                        <p:attrNameLst>
-                                          <p:attrName>style.visibility</p:attrName>
-                                        </p:attrNameLst>
-                                      </p:cBhvr>
-                                      <p:to>
-                                        <p:strVal val="visible"/>
-                                      </p:to>
-                                    </p:set>
-                                    <p:animEffect transition="in" filter="fade">
-                                      <p:cBhvr>
-                                        <p:cTn id="31" dur="500"/>
-                                        <p:tgtEl>
-                                          <p:spTgt spid="11"/>
-                                        </p:tgtEl>
-                                      </p:cBhvr>
-                                    </p:animEffect>
-                                  </p:childTnLst>
-                                </p:cTn>
-                              </p:par>
-                            </p:childTnLst>
-                          </p:cTn>
-                        </p:par>
-                        <p:par>
-                          <p:cTn id="32" fill="hold">
-                            <p:stCondLst>
-                              <p:cond delay="3500"/>
-                            </p:stCondLst>
-                            <p:childTnLst>
-                              <p:par>
-                                <p:cTn id="33" presetID="10" presetClass="entr" presetSubtype="0" fill="hold" nodeType="afterEffect">
-                                  <p:stCondLst>
-                                    <p:cond delay="0"/>
-                                  </p:stCondLst>
-                                  <p:childTnLst>
-                                    <p:set>
-                                      <p:cBhvr>
-                                        <p:cTn id="34" dur="1" fill="hold">
-                                          <p:stCondLst>
-                                            <p:cond delay="0"/>
-                                          </p:stCondLst>
-                                        </p:cTn>
-                                        <p:tgtEl>
-                                          <p:spTgt spid="12"/>
-                                        </p:tgtEl>
-                                        <p:attrNameLst>
-                                          <p:attrName>style.visibility</p:attrName>
-                                        </p:attrNameLst>
-                                      </p:cBhvr>
-                                      <p:to>
-                                        <p:strVal val="visible"/>
-                                      </p:to>
-                                    </p:set>
-                                    <p:animEffect transition="in" filter="fade">
-                                      <p:cBhvr>
-                                        <p:cTn id="35" dur="500"/>
-                                        <p:tgtEl>
-                                          <p:spTgt spid="12"/>
-                                        </p:tgtEl>
-                                      </p:cBhvr>
-                                    </p:animEffect>
-                                  </p:childTnLst>
-                                </p:cTn>
-                              </p:par>
-                            </p:childTnLst>
-                          </p:cTn>
-                        </p:par>
-                      </p:childTnLst>
-                    </p:cTn>
-                  </p:par>
-                </p:childTnLst>
-              </p:cTn>
-              <p:prevCondLst>
-                <p:cond evt="onPrev" delay="0">
-                  <p:tgtEl>
-                    <p:sldTgt/>
-                  </p:tgtEl>
-                </p:cond>
-              </p:prevCondLst>
-              <p:nextCondLst>
-                <p:cond evt="onNext" delay="0">
-                  <p:tgtEl>
-                    <p:sldTgt/>
-                  </p:tgtEl>
-                </p:cond>
-              </p:nextCondLst>
-            </p:seq>
-          </p:childTnLst>
-        </p:cTn>
-      </p:par>
-    </p:tnLst>
-  </p:timing>
-</p:sld>
-</file>
-
-<file path=ppt/slides/slide5.xml><?xml version="1.0" encoding="utf-8"?>
-<p:sld xmlns:a="http://schemas.openxmlformats.org/drawingml/2006/main" xmlns:r="http://schemas.openxmlformats.org/officeDocument/2006/relationships" xmlns:p="http://schemas.openxmlformats.org/presentationml/2006/main">
-  <p:cSld>
-    <p:spTree>
-      <p:nvGrpSpPr>
-        <p:cNvPr id="1" name=""/>
-        <p:cNvGrpSpPr/>
-        <p:nvPr/>
-      </p:nvGrpSpPr>
-      <p:grpSpPr>
-        <a:xfrm>
-          <a:off x="0" y="0"/>
-          <a:ext cx="0" cy="0"/>
-          <a:chOff x="0" y="0"/>
-          <a:chExt cx="0" cy="0"/>
-        </a:xfrm>
-      </p:grpSpPr>
-      <p:sp>
-        <p:nvSpPr>
-          <p:cNvPr id="3" name="Заголовок 2"/>
-          <p:cNvSpPr>
-            <a:spLocks noGrp="1"/>
-          </p:cNvSpPr>
-          <p:nvPr>
-            <p:ph type="title"/>
-          </p:nvPr>
-        </p:nvSpPr>
-        <p:spPr>
-          <a:xfrm>
-            <a:off x="1111348" y="-9435"/>
-            <a:ext cx="7744328" cy="874143"/>
-          </a:xfrm>
-        </p:spPr>
-        <p:txBody>
-          <a:bodyPr/>
-          <a:lstStyle/>
-          <a:p>
-            <a:r>
-              <a:rPr lang="ru-RU" dirty="0">
-                <a:latin typeface="PT Sans" panose="020B0503020203020204" pitchFamily="34" charset="-52"/>
-                <a:ea typeface="PT Sans" panose="020B0503020203020204" pitchFamily="34" charset="-52"/>
-                <a:cs typeface="Times New Roman" panose="02020603050405020304" pitchFamily="18" charset="0"/>
-              </a:rPr>
-              <a:t>Алгоритм</a:t>
-            </a:r>
-            <a:r>
-              <a:rPr lang="ru-RU" dirty="0">
-                <a:latin typeface="Times New Roman" panose="02020603050405020304" pitchFamily="18" charset="0"/>
-                <a:cs typeface="Times New Roman" panose="02020603050405020304" pitchFamily="18" charset="0"/>
-              </a:rPr>
-              <a:t> сортировки на ограниченной модели памяти для большого объема данных</a:t>
-            </a:r>
-            <a:endParaRPr lang="ru-RU" dirty="0"/>
-          </a:p>
-        </p:txBody>
-      </p:sp>
-      <p:sp>
-        <p:nvSpPr>
-          <p:cNvPr id="6" name="Содержимое 5"/>
-          <p:cNvSpPr>
-            <a:spLocks noGrp="1"/>
-          </p:cNvSpPr>
-          <p:nvPr>
-            <p:ph idx="1"/>
-          </p:nvPr>
-        </p:nvSpPr>
-        <p:spPr>
-          <a:xfrm>
-            <a:off x="370936" y="864708"/>
-            <a:ext cx="8484740" cy="5305433"/>
-          </a:xfrm>
-        </p:spPr>
-        <p:txBody>
-          <a:bodyPr/>
-          <a:lstStyle/>
-          <a:p>
-            <a:pPr marL="457200" indent="-457200">
-              <a:buFont typeface="+mj-lt"/>
-              <a:buAutoNum type="arabicPeriod"/>
-            </a:pPr>
-            <a:r>
-              <a:rPr lang="ru-RU" sz="2400" dirty="0" smtClean="0">
-                <a:latin typeface="PT Sans" panose="020B0503020203020204" pitchFamily="34" charset="-52"/>
-                <a:ea typeface="PT Sans" panose="020B0503020203020204" pitchFamily="34" charset="-52"/>
-                <a:cs typeface="Times New Roman" panose="02020603050405020304" pitchFamily="18" charset="0"/>
-              </a:rPr>
-              <a:t>Делим </a:t>
-            </a:r>
-            <a:r>
-              <a:rPr lang="ru-RU" sz="2400" dirty="0">
-                <a:latin typeface="PT Sans" panose="020B0503020203020204" pitchFamily="34" charset="-52"/>
-                <a:ea typeface="PT Sans" panose="020B0503020203020204" pitchFamily="34" charset="-52"/>
-                <a:cs typeface="Times New Roman" panose="02020603050405020304" pitchFamily="18" charset="0"/>
-              </a:rPr>
-              <a:t>массив на заданное количество частей;</a:t>
-            </a:r>
-          </a:p>
-          <a:p>
-            <a:pPr marL="457200" indent="-457200">
-              <a:buFont typeface="+mj-lt"/>
-              <a:buAutoNum type="arabicPeriod"/>
-            </a:pPr>
-            <a:r>
-              <a:rPr lang="ru-RU" sz="2400" dirty="0" smtClean="0">
-                <a:latin typeface="PT Sans" panose="020B0503020203020204" pitchFamily="34" charset="-52"/>
-                <a:ea typeface="PT Sans" panose="020B0503020203020204" pitchFamily="34" charset="-52"/>
-                <a:cs typeface="Times New Roman" panose="02020603050405020304" pitchFamily="18" charset="0"/>
-              </a:rPr>
-              <a:t>Сортируем </a:t>
-            </a:r>
-            <a:r>
-              <a:rPr lang="ru-RU" sz="2400" dirty="0">
-                <a:latin typeface="PT Sans" panose="020B0503020203020204" pitchFamily="34" charset="-52"/>
-                <a:ea typeface="PT Sans" panose="020B0503020203020204" pitchFamily="34" charset="-52"/>
-                <a:cs typeface="Times New Roman" panose="02020603050405020304" pitchFamily="18" charset="0"/>
-              </a:rPr>
-              <a:t>каждую часть отдельно</a:t>
-            </a:r>
-            <a:r>
-              <a:rPr lang="en-US" sz="2400" dirty="0">
-                <a:latin typeface="PT Sans" panose="020B0503020203020204" pitchFamily="34" charset="-52"/>
-                <a:ea typeface="PT Sans" panose="020B0503020203020204" pitchFamily="34" charset="-52"/>
-                <a:cs typeface="Times New Roman" panose="02020603050405020304" pitchFamily="18" charset="0"/>
-              </a:rPr>
-              <a:t>;</a:t>
-            </a:r>
-            <a:endParaRPr lang="ru-RU" sz="2400" dirty="0">
-              <a:latin typeface="PT Sans" panose="020B0503020203020204" pitchFamily="34" charset="-52"/>
-              <a:ea typeface="PT Sans" panose="020B0503020203020204" pitchFamily="34" charset="-52"/>
-              <a:cs typeface="Times New Roman" panose="02020603050405020304" pitchFamily="18" charset="0"/>
-            </a:endParaRPr>
-          </a:p>
-          <a:p>
-            <a:pPr marL="457200" indent="-457200">
-              <a:buFont typeface="+mj-lt"/>
-              <a:buAutoNum type="arabicPeriod"/>
-            </a:pPr>
-            <a:r>
-              <a:rPr lang="ru-RU" sz="2400" dirty="0" smtClean="0">
-                <a:latin typeface="PT Sans" panose="020B0503020203020204" pitchFamily="34" charset="-52"/>
-                <a:ea typeface="PT Sans" panose="020B0503020203020204" pitchFamily="34" charset="-52"/>
-                <a:cs typeface="Times New Roman" panose="02020603050405020304" pitchFamily="18" charset="0"/>
-              </a:rPr>
-              <a:t>Проверяем набор данных попарно на пересечение</a:t>
-            </a:r>
-            <a:r>
-              <a:rPr lang="en-US" sz="2400" dirty="0" smtClean="0">
-                <a:latin typeface="PT Sans" panose="020B0503020203020204" pitchFamily="34" charset="-52"/>
-                <a:ea typeface="PT Sans" panose="020B0503020203020204" pitchFamily="34" charset="-52"/>
-                <a:cs typeface="Times New Roman" panose="02020603050405020304" pitchFamily="18" charset="0"/>
-              </a:rPr>
-              <a:t> (</a:t>
-            </a:r>
-            <a:r>
-              <a:rPr lang="ru-RU" sz="2400" dirty="0" smtClean="0">
-                <a:latin typeface="PT Sans" panose="020B0503020203020204" pitchFamily="34" charset="-52"/>
-                <a:ea typeface="PT Sans" panose="020B0503020203020204" pitchFamily="34" charset="-52"/>
-                <a:cs typeface="Times New Roman" panose="02020603050405020304" pitchFamily="18" charset="0"/>
-              </a:rPr>
-              <a:t>пример пересечения</a:t>
-            </a:r>
-            <a:r>
-              <a:rPr lang="en-US" sz="2400" dirty="0" smtClean="0">
-                <a:latin typeface="PT Sans" panose="020B0503020203020204" pitchFamily="34" charset="-52"/>
-                <a:ea typeface="PT Sans" panose="020B0503020203020204" pitchFamily="34" charset="-52"/>
-                <a:cs typeface="Times New Roman" panose="02020603050405020304" pitchFamily="18" charset="0"/>
-              </a:rPr>
-              <a:t>: [1,2,3,6]</a:t>
-            </a:r>
-            <a:r>
-              <a:rPr lang="ru-RU" sz="2400" dirty="0" smtClean="0">
-                <a:latin typeface="PT Sans" panose="020B0503020203020204" pitchFamily="34" charset="-52"/>
-                <a:ea typeface="PT Sans" panose="020B0503020203020204" pitchFamily="34" charset="-52"/>
-                <a:cs typeface="Times New Roman" panose="02020603050405020304" pitchFamily="18" charset="0"/>
-              </a:rPr>
-              <a:t> и</a:t>
-            </a:r>
-            <a:r>
-              <a:rPr lang="en-US" sz="2400" dirty="0" smtClean="0">
-                <a:latin typeface="PT Sans" panose="020B0503020203020204" pitchFamily="34" charset="-52"/>
-                <a:ea typeface="PT Sans" panose="020B0503020203020204" pitchFamily="34" charset="-52"/>
-                <a:cs typeface="Times New Roman" panose="02020603050405020304" pitchFamily="18" charset="0"/>
-              </a:rPr>
-              <a:t> [4,5,7,9]</a:t>
-            </a:r>
-            <a:r>
-              <a:rPr lang="ru-RU" sz="2400" dirty="0" smtClean="0">
-                <a:latin typeface="PT Sans" panose="020B0503020203020204" pitchFamily="34" charset="-52"/>
-                <a:ea typeface="PT Sans" panose="020B0503020203020204" pitchFamily="34" charset="-52"/>
-                <a:cs typeface="Times New Roman" panose="02020603050405020304" pitchFamily="18" charset="0"/>
-              </a:rPr>
-              <a:t>)</a:t>
-            </a:r>
-            <a:r>
-              <a:rPr lang="en-US" sz="2400" dirty="0" smtClean="0">
-                <a:latin typeface="PT Sans" panose="020B0503020203020204" pitchFamily="34" charset="-52"/>
-                <a:ea typeface="PT Sans" panose="020B0503020203020204" pitchFamily="34" charset="-52"/>
-                <a:cs typeface="Times New Roman" panose="02020603050405020304" pitchFamily="18" charset="0"/>
-              </a:rPr>
-              <a:t>;</a:t>
-            </a:r>
-          </a:p>
-          <a:p>
-            <a:pPr marL="457200" indent="-457200">
-              <a:buFont typeface="+mj-lt"/>
-              <a:buAutoNum type="arabicPeriod"/>
-            </a:pPr>
-            <a:r>
-              <a:rPr lang="ru-RU" sz="2400" dirty="0" smtClean="0">
-                <a:latin typeface="PT Sans" panose="020B0503020203020204" pitchFamily="34" charset="-52"/>
-                <a:ea typeface="PT Sans" panose="020B0503020203020204" pitchFamily="34" charset="-52"/>
-                <a:cs typeface="Times New Roman" panose="02020603050405020304" pitchFamily="18" charset="0"/>
-              </a:rPr>
-              <a:t>Если </a:t>
-            </a:r>
-            <a:r>
-              <a:rPr lang="ru-RU" sz="2400" dirty="0">
-                <a:latin typeface="PT Sans" panose="020B0503020203020204" pitchFamily="34" charset="-52"/>
-                <a:ea typeface="PT Sans" panose="020B0503020203020204" pitchFamily="34" charset="-52"/>
-                <a:cs typeface="Times New Roman" panose="02020603050405020304" pitchFamily="18" charset="0"/>
-              </a:rPr>
-              <a:t>наблюдается пересечения объединяем пару в и сортируем</a:t>
-            </a:r>
-            <a:r>
-              <a:rPr lang="en-US" sz="2400" dirty="0">
-                <a:latin typeface="PT Sans" panose="020B0503020203020204" pitchFamily="34" charset="-52"/>
-                <a:ea typeface="PT Sans" panose="020B0503020203020204" pitchFamily="34" charset="-52"/>
-                <a:cs typeface="Times New Roman" panose="02020603050405020304" pitchFamily="18" charset="0"/>
-              </a:rPr>
-              <a:t>;</a:t>
-            </a:r>
-            <a:endParaRPr lang="ru-RU" sz="2400" dirty="0">
-              <a:latin typeface="PT Sans" panose="020B0503020203020204" pitchFamily="34" charset="-52"/>
-              <a:ea typeface="PT Sans" panose="020B0503020203020204" pitchFamily="34" charset="-52"/>
-              <a:cs typeface="Times New Roman" panose="02020603050405020304" pitchFamily="18" charset="0"/>
-            </a:endParaRPr>
-          </a:p>
-          <a:p>
-            <a:pPr marL="457200" indent="-457200">
-              <a:buFont typeface="+mj-lt"/>
-              <a:buAutoNum type="arabicPeriod"/>
-            </a:pPr>
-            <a:r>
-              <a:rPr lang="ru-RU" sz="2400" dirty="0" smtClean="0">
-                <a:latin typeface="PT Sans" panose="020B0503020203020204" pitchFamily="34" charset="-52"/>
-                <a:ea typeface="PT Sans" panose="020B0503020203020204" pitchFamily="34" charset="-52"/>
-                <a:cs typeface="Times New Roman" panose="02020603050405020304" pitchFamily="18" charset="0"/>
-              </a:rPr>
-              <a:t>Разбиваем </a:t>
-            </a:r>
-            <a:r>
-              <a:rPr lang="ru-RU" sz="2400" dirty="0">
-                <a:latin typeface="PT Sans" panose="020B0503020203020204" pitchFamily="34" charset="-52"/>
-                <a:ea typeface="PT Sans" panose="020B0503020203020204" pitchFamily="34" charset="-52"/>
-                <a:cs typeface="Times New Roman" panose="02020603050405020304" pitchFamily="18" charset="0"/>
-              </a:rPr>
-              <a:t>отсортированный массив обратно на пары и возвращаем на места</a:t>
-            </a:r>
-            <a:r>
-              <a:rPr lang="en-US" sz="2400" dirty="0">
-                <a:latin typeface="PT Sans" panose="020B0503020203020204" pitchFamily="34" charset="-52"/>
-                <a:ea typeface="PT Sans" panose="020B0503020203020204" pitchFamily="34" charset="-52"/>
-                <a:cs typeface="Times New Roman" panose="02020603050405020304" pitchFamily="18" charset="0"/>
-              </a:rPr>
-              <a:t>;</a:t>
-            </a:r>
-            <a:endParaRPr lang="ru-RU" dirty="0">
-              <a:latin typeface="PT Sans" panose="020B0503020203020204" pitchFamily="34" charset="-52"/>
-              <a:ea typeface="PT Sans" panose="020B0503020203020204" pitchFamily="34" charset="-52"/>
-            </a:endParaRPr>
-          </a:p>
-        </p:txBody>
-      </p:sp>
-    </p:spTree>
-    <p:extLst>
-      <p:ext uri="{BB962C8B-B14F-4D97-AF65-F5344CB8AC3E}">
-        <p14:creationId xmlns:p14="http://schemas.microsoft.com/office/powerpoint/2010/main" val="2739222218"/>
-      </p:ext>
-    </p:extLst>
-  </p:cSld>
-  <p:clrMapOvr>
-    <a:masterClrMapping/>
-  </p:clrMapOvr>
-  <p:transition spd="med" advTm="8000"/>
-  <p:timing>
-    <p:tnLst>
-      <p:par>
-        <p:cTn id="1" dur="indefinite" restart="never" nodeType="tmRoot"/>
-      </p:par>
-    </p:tnLst>
-  </p:timing>
-</p:sld>
-</file>
-
-<file path=ppt/slides/slide6.xml><?xml version="1.0" encoding="utf-8"?>
-<p:sld xmlns:a="http://schemas.openxmlformats.org/drawingml/2006/main" xmlns:r="http://schemas.openxmlformats.org/officeDocument/2006/relationships" xmlns:p="http://schemas.openxmlformats.org/presentationml/2006/main">
-  <p:cSld>
-    <p:spTree>
-      <p:nvGrpSpPr>
-        <p:cNvPr id="1" name=""/>
-        <p:cNvGrpSpPr/>
-        <p:nvPr/>
-      </p:nvGrpSpPr>
-      <p:grpSpPr>
-        <a:xfrm>
-          <a:off x="0" y="0"/>
-          <a:ext cx="0" cy="0"/>
-          <a:chOff x="0" y="0"/>
-          <a:chExt cx="0" cy="0"/>
-        </a:xfrm>
-      </p:grpSpPr>
-      <p:sp>
-        <p:nvSpPr>
-          <p:cNvPr id="3" name="Заголовок 2"/>
-          <p:cNvSpPr>
-            <a:spLocks noGrp="1"/>
-          </p:cNvSpPr>
-          <p:nvPr>
-            <p:ph type="title"/>
-          </p:nvPr>
-        </p:nvSpPr>
-        <p:spPr>
-          <a:xfrm>
-            <a:off x="789687" y="0"/>
+            <a:off x="858698" y="252054"/>
             <a:ext cx="8354313" cy="599639"/>
           </a:xfrm>
         </p:spPr>
@@ -12145,14 +10842,14 @@
                 <a:gridCol w="3206496">
                   <a:extLst>
                     <a:ext uri="{9D8B030D-6E8A-4147-A177-3AD203B41FA5}">
-                      <a16:colId xmlns:a16="http://schemas.microsoft.com/office/drawing/2014/main" val="20000"/>
+                      <a16:colId xmlns="" xmlns:a16="http://schemas.microsoft.com/office/drawing/2014/main" val="20000"/>
                     </a:ext>
                   </a:extLst>
                 </a:gridCol>
                 <a:gridCol w="3206496">
                   <a:extLst>
                     <a:ext uri="{9D8B030D-6E8A-4147-A177-3AD203B41FA5}">
-                      <a16:colId xmlns:a16="http://schemas.microsoft.com/office/drawing/2014/main" val="20001"/>
+                      <a16:colId xmlns="" xmlns:a16="http://schemas.microsoft.com/office/drawing/2014/main" val="20001"/>
                     </a:ext>
                   </a:extLst>
                 </a:gridCol>
@@ -12190,7 +10887,7 @@
                 </a:tc>
                 <a:extLst>
                   <a:ext uri="{0D108BD9-81ED-4DB2-BD59-A6C34878D82A}">
-                    <a16:rowId xmlns:a16="http://schemas.microsoft.com/office/drawing/2014/main" val="10000"/>
+                    <a16:rowId xmlns="" xmlns:a16="http://schemas.microsoft.com/office/drawing/2014/main" val="10000"/>
                   </a:ext>
                 </a:extLst>
               </a:tr>
@@ -12227,7 +10924,7 @@
                 </a:tc>
                 <a:extLst>
                   <a:ext uri="{0D108BD9-81ED-4DB2-BD59-A6C34878D82A}">
-                    <a16:rowId xmlns:a16="http://schemas.microsoft.com/office/drawing/2014/main" val="10001"/>
+                    <a16:rowId xmlns="" xmlns:a16="http://schemas.microsoft.com/office/drawing/2014/main" val="10001"/>
                   </a:ext>
                 </a:extLst>
               </a:tr>
@@ -12268,7 +10965,7 @@
                 </a:tc>
                 <a:extLst>
                   <a:ext uri="{0D108BD9-81ED-4DB2-BD59-A6C34878D82A}">
-                    <a16:rowId xmlns:a16="http://schemas.microsoft.com/office/drawing/2014/main" val="10002"/>
+                    <a16:rowId xmlns="" xmlns:a16="http://schemas.microsoft.com/office/drawing/2014/main" val="10002"/>
                   </a:ext>
                 </a:extLst>
               </a:tr>
@@ -12309,7 +11006,7 @@
                 </a:tc>
                 <a:extLst>
                   <a:ext uri="{0D108BD9-81ED-4DB2-BD59-A6C34878D82A}">
-                    <a16:rowId xmlns:a16="http://schemas.microsoft.com/office/drawing/2014/main" val="10003"/>
+                    <a16:rowId xmlns="" xmlns:a16="http://schemas.microsoft.com/office/drawing/2014/main" val="10003"/>
                   </a:ext>
                 </a:extLst>
               </a:tr>
@@ -12335,7 +11032,7 @@
         </p:spPr>
         <p:txBody>
           <a:bodyPr>
-            <a:normAutofit/>
+            <a:normAutofit lnSpcReduction="10000"/>
           </a:bodyPr>
           <a:lstStyle/>
           <a:p>
@@ -12519,7 +11216,7 @@
 </p:sld>
 </file>
 
-<file path=ppt/slides/slide7.xml><?xml version="1.0" encoding="utf-8"?>
+<file path=ppt/slides/slide5.xml><?xml version="1.0" encoding="utf-8"?>
 <p:sld xmlns:a="http://schemas.openxmlformats.org/drawingml/2006/main" xmlns:r="http://schemas.openxmlformats.org/officeDocument/2006/relationships" xmlns:p="http://schemas.openxmlformats.org/presentationml/2006/main">
   <p:cSld>
     <p:spTree>
@@ -12548,7 +11245,7 @@
         </p:nvSpPr>
         <p:spPr>
           <a:xfrm>
-            <a:off x="789687" y="0"/>
+            <a:off x="867324" y="244292"/>
             <a:ext cx="8354313" cy="599639"/>
           </a:xfrm>
         </p:spPr>
@@ -12653,7 +11350,7 @@
         <p:spPr>
           <a:xfrm>
             <a:off x="4443599" y="1410627"/>
-            <a:ext cx="4432691" cy="4036746"/>
+            <a:ext cx="4432691" cy="2554545"/>
           </a:xfrm>
           <a:prstGeom prst="rect">
             <a:avLst/>
@@ -12666,96 +11363,85 @@
           <a:lstStyle/>
           <a:p>
             <a:r>
-              <a:rPr lang="ru-RU" sz="2400" dirty="0">
-                <a:latin typeface="PT Sans" panose="020B0503020203020204" pitchFamily="34" charset="-52"/>
-                <a:ea typeface="PT Sans" panose="020B0503020203020204" pitchFamily="34" charset="-52"/>
-                <a:cs typeface="Times New Roman" panose="02020603050405020304" pitchFamily="18" charset="0"/>
+              <a:rPr lang="ru-RU" sz="1600" dirty="0" smtClean="0">
+                <a:latin typeface="PT Sans"/>
               </a:rPr>
-              <a:t>Среди представленных сортировок только 2 могут похвастаться стабильностью и сложностью O(n). Одна из них TimSort, </a:t>
-            </a:r>
-            <a:r>
-              <a:rPr lang="ru-RU" sz="2400" dirty="0" smtClean="0">
-                <a:latin typeface="PT Sans" panose="020B0503020203020204" pitchFamily="34" charset="-52"/>
-                <a:ea typeface="PT Sans" panose="020B0503020203020204" pitchFamily="34" charset="-52"/>
-                <a:cs typeface="Times New Roman" panose="02020603050405020304" pitchFamily="18" charset="0"/>
+              <a:t>Среди</a:t>
+            </a:r>
+            <a:r>
+              <a:rPr lang="ru-RU" sz="1600" dirty="0">
+                <a:latin typeface="PT Sans"/>
               </a:rPr>
-              <a:t>вторая</a:t>
-            </a:r>
-            <a:r>
-              <a:rPr lang="en-US" sz="2400" dirty="0" smtClean="0">
-                <a:latin typeface="PT Sans" panose="020B0503020203020204" pitchFamily="34" charset="-52"/>
-                <a:ea typeface="PT Sans" panose="020B0503020203020204" pitchFamily="34" charset="-52"/>
-                <a:cs typeface="Times New Roman" panose="02020603050405020304" pitchFamily="18" charset="0"/>
+              <a:t>, на первый взгляд, огромного выбора в таблице есть всего 7 адекватных алгоритмов (со сложностью </a:t>
+            </a:r>
+            <a:r>
+              <a:rPr lang="ru-RU" sz="1600" i="1" dirty="0">
+                <a:latin typeface="PT Sans"/>
               </a:rPr>
-              <a:t> - </a:t>
-            </a:r>
-            <a:r>
-              <a:rPr lang="ru-RU" sz="2400" dirty="0" smtClean="0">
-                <a:latin typeface="PT Sans" panose="020B0503020203020204" pitchFamily="34" charset="-52"/>
-                <a:ea typeface="PT Sans" panose="020B0503020203020204" pitchFamily="34" charset="-52"/>
-                <a:cs typeface="Times New Roman" panose="02020603050405020304" pitchFamily="18" charset="0"/>
+              <a:t>O(n </a:t>
+            </a:r>
+            <a:r>
+              <a:rPr lang="ru-RU" sz="1600" i="1" dirty="0" err="1">
+                <a:latin typeface="PT Sans"/>
               </a:rPr>
-              <a:t>“</a:t>
-            </a:r>
-            <a:r>
-              <a:rPr lang="ru-RU" sz="2400" dirty="0">
-                <a:latin typeface="PT Sans" panose="020B0503020203020204" pitchFamily="34" charset="-52"/>
-                <a:ea typeface="PT Sans" panose="020B0503020203020204" pitchFamily="34" charset="-52"/>
-                <a:cs typeface="Times New Roman" panose="02020603050405020304" pitchFamily="18" charset="0"/>
+              <a:t>logn</a:t>
+            </a:r>
+            <a:r>
+              <a:rPr lang="ru-RU" sz="1600" i="1" dirty="0">
+                <a:latin typeface="PT Sans"/>
               </a:rPr>
-              <a:t>сортировка с помощью двоичного дерева</a:t>
-            </a:r>
-            <a:r>
-              <a:rPr lang="ru-RU" sz="2400" dirty="0" smtClean="0">
-                <a:latin typeface="PT Sans" panose="020B0503020203020204" pitchFamily="34" charset="-52"/>
-                <a:ea typeface="PT Sans" panose="020B0503020203020204" pitchFamily="34" charset="-52"/>
-                <a:cs typeface="Times New Roman" panose="02020603050405020304" pitchFamily="18" charset="0"/>
+              <a:t>)</a:t>
+            </a:r>
+            <a:r>
+              <a:rPr lang="ru-RU" sz="1600" dirty="0">
+                <a:latin typeface="PT Sans"/>
               </a:rPr>
-              <a:t>”</a:t>
-            </a:r>
-            <a:r>
-              <a:rPr lang="en-US" sz="2400" dirty="0">
-                <a:latin typeface="PT Sans" panose="020B0503020203020204" pitchFamily="34" charset="-52"/>
-                <a:ea typeface="PT Sans" panose="020B0503020203020204" pitchFamily="34" charset="-52"/>
-                <a:cs typeface="Times New Roman" panose="02020603050405020304" pitchFamily="18" charset="0"/>
+              <a:t> в среднем и худшем случае), среди которых только </a:t>
+            </a:r>
+            <a:r>
+              <a:rPr lang="ru-RU" sz="1600" dirty="0" smtClean="0">
+                <a:latin typeface="PT Sans"/>
+              </a:rPr>
+              <a:t>две </a:t>
+            </a:r>
+            <a:r>
+              <a:rPr lang="ru-RU" sz="1600" dirty="0">
+                <a:latin typeface="PT Sans"/>
+              </a:rPr>
+              <a:t>могут похвастаться стабильностью и сложностью </a:t>
+            </a:r>
+            <a:r>
+              <a:rPr lang="ru-RU" sz="1600" i="1" dirty="0">
+                <a:latin typeface="PT Sans"/>
+              </a:rPr>
+              <a:t>O(n)</a:t>
+            </a:r>
+            <a:r>
+              <a:rPr lang="ru-RU" sz="1600" dirty="0">
+                <a:latin typeface="PT Sans"/>
+              </a:rPr>
+              <a:t> в лучшем случае. Один из этих двух — это давно и хорошо всем известная «Сортировка с помощью двоичного дерева». А вот второй как-раз таки </a:t>
+            </a:r>
+            <a:r>
+              <a:rPr lang="ru-RU" sz="1600" dirty="0" err="1">
+                <a:latin typeface="PT Sans"/>
+              </a:rPr>
+              <a:t>Timsort</a:t>
+            </a:r>
+            <a:r>
+              <a:rPr lang="ru-RU" sz="1600" dirty="0">
+                <a:latin typeface="PT Sans"/>
               </a:rPr>
               <a:t>.</a:t>
             </a:r>
-            <a:endParaRPr lang="ru-RU" sz="2400" dirty="0">
-              <a:latin typeface="PT Sans" panose="020B0503020203020204" pitchFamily="34" charset="-52"/>
-              <a:ea typeface="PT Sans" panose="020B0503020203020204" pitchFamily="34" charset="-52"/>
-              <a:cs typeface="Times New Roman" panose="02020603050405020304" pitchFamily="18" charset="0"/>
+            <a:br>
+              <a:rPr lang="ru-RU" sz="1600" dirty="0">
+                <a:latin typeface="PT Sans"/>
+              </a:rPr>
+            </a:br>
+            <a:endParaRPr lang="ru-RU" sz="1600" dirty="0">
+              <a:latin typeface="PT Sans"/>
             </a:endParaRPr>
-          </a:p>
-          <a:p>
-            <a:r>
-              <a:rPr lang="ru-RU" sz="2400" dirty="0">
-                <a:latin typeface="PT Sans" panose="020B0503020203020204" pitchFamily="34" charset="-52"/>
-                <a:ea typeface="PT Sans" panose="020B0503020203020204" pitchFamily="34" charset="-52"/>
-                <a:cs typeface="Times New Roman" panose="02020603050405020304" pitchFamily="18" charset="0"/>
-              </a:rPr>
-              <a:t>Была выбрана более современная сортировка</a:t>
-            </a:r>
-          </a:p>
-          <a:p>
-            <a:r>
-              <a:rPr lang="ru-RU" sz="2400" dirty="0">
-                <a:latin typeface="PT Sans" panose="020B0503020203020204" pitchFamily="34" charset="-52"/>
-                <a:ea typeface="PT Sans" panose="020B0503020203020204" pitchFamily="34" charset="-52"/>
-                <a:cs typeface="Times New Roman" panose="02020603050405020304" pitchFamily="18" charset="0"/>
-              </a:rPr>
-              <a:t>TimSort.</a:t>
-            </a:r>
-          </a:p>
-          <a:p>
-            <a:r>
-              <a:rPr lang="ru-RU" dirty="0"/>
-              <a:t/>
-            </a:r>
-            <a:br>
-              <a:rPr lang="ru-RU" dirty="0"/>
-            </a:br>
-            <a:endParaRPr lang="ru-RU" dirty="0"/>
           </a:p>
         </p:txBody>
       </p:sp>
@@ -12939,7 +11625,7 @@
 </p:sld>
 </file>
 
-<file path=ppt/slides/slide8.xml><?xml version="1.0" encoding="utf-8"?>
+<file path=ppt/slides/slide6.xml><?xml version="1.0" encoding="utf-8"?>
 <p:sld xmlns:a="http://schemas.openxmlformats.org/drawingml/2006/main" xmlns:r="http://schemas.openxmlformats.org/officeDocument/2006/relationships" xmlns:p="http://schemas.openxmlformats.org/presentationml/2006/main">
   <p:cSld>
     <p:spTree>
@@ -12968,7 +11654,7 @@
         </p:nvSpPr>
         <p:spPr>
           <a:xfrm>
-            <a:off x="1089764" y="-9435"/>
+            <a:off x="1089764" y="145841"/>
             <a:ext cx="7596187" cy="717889"/>
           </a:xfrm>
         </p:spPr>
@@ -12996,8 +11682,8 @@
         </p:nvSpPr>
         <p:spPr>
           <a:xfrm>
-            <a:off x="457200" y="2438400"/>
-            <a:ext cx="8229644" cy="3770173"/>
+            <a:off x="457200" y="1042588"/>
+            <a:ext cx="8229644" cy="5165986"/>
           </a:xfrm>
         </p:spPr>
         <p:txBody>
@@ -13008,7 +11694,7 @@
               <a:buNone/>
             </a:pPr>
             <a:r>
-              <a:rPr lang="ru-RU" sz="3200" dirty="0">
+              <a:rPr lang="ru-RU" sz="2400" dirty="0">
                 <a:latin typeface="PT Sans" panose="020B0503020203020204" pitchFamily="34" charset="-52"/>
                 <a:ea typeface="PT Sans" panose="020B0503020203020204" pitchFamily="34" charset="-52"/>
                 <a:cs typeface="Times New Roman" panose="02020603050405020304" pitchFamily="18" charset="0"/>
@@ -13018,7 +11704,7 @@
           </a:p>
           <a:p>
             <a:r>
-              <a:rPr lang="ru-RU" sz="2800" dirty="0">
+              <a:rPr lang="ru-RU" sz="2400" dirty="0">
                 <a:latin typeface="PT Sans" panose="020B0503020203020204" pitchFamily="34" charset="-52"/>
                 <a:ea typeface="PT Sans" panose="020B0503020203020204" pitchFamily="34" charset="-52"/>
                 <a:cs typeface="Times New Roman" panose="02020603050405020304" pitchFamily="18" charset="0"/>
@@ -13026,7 +11712,7 @@
               <a:t>По специальному алгоритму разделяем входной массив на подмассивы</a:t>
             </a:r>
             <a:r>
-              <a:rPr lang="en-US" sz="2800" dirty="0">
+              <a:rPr lang="en-US" sz="2400" dirty="0">
                 <a:latin typeface="PT Sans" panose="020B0503020203020204" pitchFamily="34" charset="-52"/>
                 <a:ea typeface="PT Sans" panose="020B0503020203020204" pitchFamily="34" charset="-52"/>
                 <a:cs typeface="Times New Roman" panose="02020603050405020304" pitchFamily="18" charset="0"/>
@@ -13034,14 +11720,14 @@
               <a:t>;</a:t>
             </a:r>
             <a:r>
-              <a:rPr lang="ru-RU" sz="2800" dirty="0">
+              <a:rPr lang="ru-RU" sz="2400" dirty="0">
                 <a:latin typeface="PT Sans" panose="020B0503020203020204" pitchFamily="34" charset="-52"/>
                 <a:ea typeface="PT Sans" panose="020B0503020203020204" pitchFamily="34" charset="-52"/>
                 <a:cs typeface="Times New Roman" panose="02020603050405020304" pitchFamily="18" charset="0"/>
               </a:rPr>
               <a:t> </a:t>
             </a:r>
-            <a:endParaRPr lang="en-US" sz="2800" dirty="0">
+            <a:endParaRPr lang="en-US" sz="2400" dirty="0">
               <a:latin typeface="PT Sans" panose="020B0503020203020204" pitchFamily="34" charset="-52"/>
               <a:ea typeface="PT Sans" panose="020B0503020203020204" pitchFamily="34" charset="-52"/>
               <a:cs typeface="Times New Roman" panose="02020603050405020304" pitchFamily="18" charset="0"/>
@@ -13049,7 +11735,7 @@
           </a:p>
           <a:p>
             <a:r>
-              <a:rPr lang="ru-RU" sz="2800" dirty="0">
+              <a:rPr lang="ru-RU" sz="2400" dirty="0">
                 <a:latin typeface="PT Sans" panose="020B0503020203020204" pitchFamily="34" charset="-52"/>
                 <a:ea typeface="PT Sans" panose="020B0503020203020204" pitchFamily="34" charset="-52"/>
                 <a:cs typeface="Times New Roman" panose="02020603050405020304" pitchFamily="18" charset="0"/>
@@ -13057,14 +11743,14 @@
               <a:t>Сортируем каждый подмассив с помощью сортировки </a:t>
             </a:r>
             <a:r>
-              <a:rPr lang="en-US" sz="2800" dirty="0">
+              <a:rPr lang="en-US" sz="2400" dirty="0">
                 <a:latin typeface="PT Sans" panose="020B0503020203020204" pitchFamily="34" charset="-52"/>
                 <a:ea typeface="PT Sans" panose="020B0503020203020204" pitchFamily="34" charset="-52"/>
                 <a:cs typeface="Times New Roman" panose="02020603050405020304" pitchFamily="18" charset="0"/>
               </a:rPr>
               <a:t>STL;</a:t>
             </a:r>
-            <a:endParaRPr lang="ru-RU" sz="2800" dirty="0">
+            <a:endParaRPr lang="ru-RU" sz="2400" dirty="0">
               <a:latin typeface="PT Sans" panose="020B0503020203020204" pitchFamily="34" charset="-52"/>
               <a:ea typeface="PT Sans" panose="020B0503020203020204" pitchFamily="34" charset="-52"/>
               <a:cs typeface="Times New Roman" panose="02020603050405020304" pitchFamily="18" charset="0"/>
@@ -13072,7 +11758,7 @@
           </a:p>
           <a:p>
             <a:r>
-              <a:rPr lang="ru-RU" sz="2800" dirty="0">
+              <a:rPr lang="ru-RU" sz="2400" dirty="0">
                 <a:latin typeface="PT Sans" panose="020B0503020203020204" pitchFamily="34" charset="-52"/>
                 <a:ea typeface="PT Sans" panose="020B0503020203020204" pitchFamily="34" charset="-52"/>
                 <a:cs typeface="Times New Roman" panose="02020603050405020304" pitchFamily="18" charset="0"/>
@@ -13080,53 +11766,325 @@
               <a:t>Собираем отсортированные подмассивы в единый массив с помощью модифицированной сортировки слиянием</a:t>
             </a:r>
             <a:r>
-              <a:rPr lang="en-US" sz="2800" dirty="0">
+              <a:rPr lang="en-US" sz="2400" dirty="0">
                 <a:latin typeface="PT Sans" panose="020B0503020203020204" pitchFamily="34" charset="-52"/>
                 <a:ea typeface="PT Sans" panose="020B0503020203020204" pitchFamily="34" charset="-52"/>
                 <a:cs typeface="Times New Roman" panose="02020603050405020304" pitchFamily="18" charset="0"/>
               </a:rPr>
               <a:t>;</a:t>
             </a:r>
-            <a:endParaRPr lang="ru-RU" dirty="0">
+            <a:endParaRPr lang="ru-RU" sz="2400" dirty="0">
               <a:latin typeface="PT Sans" panose="020B0503020203020204" pitchFamily="34" charset="-52"/>
               <a:ea typeface="PT Sans" panose="020B0503020203020204" pitchFamily="34" charset="-52"/>
             </a:endParaRPr>
+          </a:p>
+        </p:txBody>
+      </p:sp>
+    </p:spTree>
+  </p:cSld>
+  <p:clrMapOvr>
+    <a:masterClrMapping/>
+  </p:clrMapOvr>
+  <p:transition spd="med" advTm="8000"/>
+  <p:timing>
+    <p:tnLst>
+      <p:par>
+        <p:cTn id="1" dur="indefinite" restart="never" nodeType="tmRoot"/>
+      </p:par>
+    </p:tnLst>
+  </p:timing>
+</p:sld>
+</file>
+
+<file path=ppt/slides/slide7.xml><?xml version="1.0" encoding="utf-8"?>
+<p:sld xmlns:a="http://schemas.openxmlformats.org/drawingml/2006/main" xmlns:r="http://schemas.openxmlformats.org/officeDocument/2006/relationships" xmlns:p="http://schemas.openxmlformats.org/presentationml/2006/main">
+  <p:cSld>
+    <p:spTree>
+      <p:nvGrpSpPr>
+        <p:cNvPr id="1" name=""/>
+        <p:cNvGrpSpPr/>
+        <p:nvPr/>
+      </p:nvGrpSpPr>
+      <p:grpSpPr>
+        <a:xfrm>
+          <a:off x="0" y="0"/>
+          <a:ext cx="0" cy="0"/>
+          <a:chOff x="0" y="0"/>
+          <a:chExt cx="0" cy="0"/>
+        </a:xfrm>
+      </p:grpSpPr>
+      <p:sp>
+        <p:nvSpPr>
+          <p:cNvPr id="2" name="Объект 1"/>
+          <p:cNvSpPr>
+            <a:spLocks noGrp="1"/>
+          </p:cNvSpPr>
+          <p:nvPr>
+            <p:ph idx="1"/>
+          </p:nvPr>
+        </p:nvSpPr>
+        <p:spPr>
+          <a:xfrm>
+            <a:off x="0" y="3777240"/>
+            <a:ext cx="8769281" cy="2606467"/>
+          </a:xfrm>
+        </p:spPr>
+        <p:txBody>
+          <a:bodyPr/>
+          <a:lstStyle/>
+          <a:p>
+            <a:pPr marL="402899" indent="-342900">
+              <a:buFont typeface="+mj-lt"/>
+              <a:buAutoNum type="arabicPeriod"/>
+            </a:pPr>
+            <a:r>
+              <a:rPr lang="ru-RU" sz="1400" dirty="0" smtClean="0"/>
+              <a:t>Создается </a:t>
+            </a:r>
+            <a:r>
+              <a:rPr lang="ru-RU" sz="1400" dirty="0"/>
+              <a:t>пустой стек пар &lt;индекс начала </a:t>
+            </a:r>
+            <a:r>
+              <a:rPr lang="ru-RU" sz="1400" dirty="0" err="1"/>
+              <a:t>подмассива</a:t>
+            </a:r>
+            <a:r>
+              <a:rPr lang="ru-RU" sz="1400" dirty="0"/>
+              <a:t>&gt;-&lt;размер </a:t>
+            </a:r>
+            <a:r>
+              <a:rPr lang="ru-RU" sz="1400" dirty="0" err="1"/>
+              <a:t>подмассива</a:t>
+            </a:r>
+            <a:r>
+              <a:rPr lang="ru-RU" sz="1400" dirty="0"/>
+              <a:t>&gt;. Берётся первый упорядоченный </a:t>
+            </a:r>
+            <a:r>
+              <a:rPr lang="ru-RU" sz="1400" dirty="0" smtClean="0"/>
+              <a:t>подмассив</a:t>
+            </a:r>
+            <a:r>
+              <a:rPr lang="en-US" sz="1400" dirty="0" smtClean="0"/>
+              <a:t>;</a:t>
+            </a:r>
+            <a:endParaRPr lang="ru-RU" sz="1400" dirty="0"/>
+          </a:p>
+          <a:p>
+            <a:pPr marL="402899" indent="-342900">
+              <a:buFont typeface="+mj-lt"/>
+              <a:buAutoNum type="arabicPeriod"/>
+            </a:pPr>
+            <a:r>
+              <a:rPr lang="ru-RU" sz="1400" dirty="0" smtClean="0"/>
+              <a:t>В </a:t>
+            </a:r>
+            <a:r>
+              <a:rPr lang="ru-RU" sz="1400" dirty="0"/>
+              <a:t>стек добавляется пара данных &lt;индекс начала&gt;-&lt;размер&gt; для текущего </a:t>
+            </a:r>
+            <a:r>
+              <a:rPr lang="ru-RU" sz="1400" dirty="0" err="1" smtClean="0"/>
+              <a:t>подмассива</a:t>
+            </a:r>
+            <a:r>
+              <a:rPr lang="en-US" sz="1400" dirty="0"/>
+              <a:t>;</a:t>
+            </a:r>
+            <a:endParaRPr lang="ru-RU" sz="1400" dirty="0" smtClean="0"/>
+          </a:p>
+          <a:p>
+            <a:pPr marL="402899" indent="-342900">
+              <a:buFont typeface="+mj-lt"/>
+              <a:buAutoNum type="arabicPeriod"/>
+            </a:pPr>
+            <a:r>
+              <a:rPr lang="ru-RU" sz="1400" dirty="0" smtClean="0"/>
+              <a:t>Определяется, нужно ли выполнять процедуру слияния текущего </a:t>
+            </a:r>
+            <a:r>
+              <a:rPr lang="ru-RU" sz="1400" dirty="0" err="1" smtClean="0"/>
+              <a:t>подмассива</a:t>
+            </a:r>
+            <a:r>
+              <a:rPr lang="ru-RU" sz="1400" dirty="0" smtClean="0"/>
+              <a:t> с предыдущими. Для этого проверяется выполнение двух правил (пусть X, Y и Z — размеры трёх верхних в стеке </a:t>
+            </a:r>
+            <a:r>
+              <a:rPr lang="ru-RU" sz="1400" dirty="0" err="1" smtClean="0"/>
+              <a:t>подмассивов</a:t>
+            </a:r>
+            <a:r>
+              <a:rPr lang="ru-RU" sz="1400" dirty="0" smtClean="0"/>
+              <a:t>): </a:t>
+            </a:r>
+            <a:r>
+              <a:rPr lang="en-US" sz="1400" dirty="0" smtClean="0"/>
+              <a:t/>
+            </a:r>
+            <a:br>
+              <a:rPr lang="en-US" sz="1400" dirty="0" smtClean="0"/>
+            </a:br>
+            <a:r>
+              <a:rPr lang="ru-RU" sz="1400" dirty="0" smtClean="0"/>
+              <a:t>X &gt; Y + Z</a:t>
+            </a:r>
+            <a:r>
+              <a:rPr lang="en-US" sz="1400" dirty="0" smtClean="0"/>
+              <a:t/>
+            </a:r>
+            <a:br>
+              <a:rPr lang="en-US" sz="1400" dirty="0" smtClean="0"/>
+            </a:br>
+            <a:r>
+              <a:rPr lang="ru-RU" sz="1400" dirty="0" smtClean="0"/>
+              <a:t>Y &gt; Z</a:t>
+            </a:r>
+          </a:p>
+          <a:p>
+            <a:pPr marL="402899" indent="-342900">
+              <a:buFont typeface="+mj-lt"/>
+              <a:buAutoNum type="arabicPeriod"/>
+            </a:pPr>
+            <a:r>
+              <a:rPr lang="ru-RU" sz="1400" dirty="0" smtClean="0"/>
+              <a:t>Если одно из правил нарушается — массив Y сливается с меньшим из массивов X и Z. Повторяется до выполнения обоих правил или полного упорядочивания данных</a:t>
+            </a:r>
+            <a:r>
+              <a:rPr lang="en-US" sz="1400" dirty="0" smtClean="0"/>
+              <a:t>;</a:t>
+            </a:r>
+            <a:endParaRPr lang="ru-RU" sz="1400" dirty="0" smtClean="0"/>
+          </a:p>
+          <a:p>
+            <a:pPr marL="402899" indent="-342900">
+              <a:buFont typeface="+mj-lt"/>
+              <a:buAutoNum type="arabicPeriod"/>
+            </a:pPr>
+            <a:r>
+              <a:rPr lang="ru-RU" sz="1400" dirty="0" smtClean="0"/>
+              <a:t>Если </a:t>
+            </a:r>
+            <a:r>
+              <a:rPr lang="ru-RU" sz="1400" dirty="0"/>
+              <a:t>еще остались не рассмотренные </a:t>
+            </a:r>
+            <a:r>
+              <a:rPr lang="ru-RU" sz="1400" dirty="0" err="1"/>
+              <a:t>подмассивы</a:t>
+            </a:r>
+            <a:r>
+              <a:rPr lang="ru-RU" sz="1400" dirty="0"/>
+              <a:t> — берётся следующий и переходим к пункту 2. Иначе — </a:t>
+            </a:r>
+            <a:r>
+              <a:rPr lang="ru-RU" sz="1400" dirty="0" smtClean="0"/>
+              <a:t>конец</a:t>
+            </a:r>
+            <a:r>
+              <a:rPr lang="en-US" sz="1400" dirty="0" smtClean="0"/>
+              <a:t>;</a:t>
+            </a:r>
+            <a:endParaRPr lang="ru-RU" sz="1400" dirty="0"/>
+          </a:p>
+          <a:p>
+            <a:pPr marL="402899" lvl="0" indent="-342900">
+              <a:buFont typeface="+mj-lt"/>
+              <a:buAutoNum type="arabicPeriod"/>
+            </a:pPr>
+            <a:endParaRPr lang="ru-RU" sz="1400" dirty="0"/>
           </a:p>
         </p:txBody>
       </p:sp>
       <p:sp>
         <p:nvSpPr>
-          <p:cNvPr id="5" name="Прямоугольник 4"/>
-          <p:cNvSpPr/>
-          <p:nvPr/>
+          <p:cNvPr id="3" name="Заголовок 2"/>
+          <p:cNvSpPr>
+            <a:spLocks noGrp="1"/>
+          </p:cNvSpPr>
+          <p:nvPr>
+            <p:ph type="title"/>
+          </p:nvPr>
         </p:nvSpPr>
         <p:spPr>
           <a:xfrm>
-            <a:off x="348932" y="1279990"/>
-            <a:ext cx="6096000" cy="800219"/>
+            <a:off x="880217" y="0"/>
+            <a:ext cx="7825393" cy="874143"/>
+          </a:xfrm>
+        </p:spPr>
+        <p:txBody>
+          <a:bodyPr/>
+          <a:lstStyle/>
+          <a:p>
+            <a:r>
+              <a:rPr lang="ru-RU" dirty="0" smtClean="0"/>
+              <a:t>Алгоритм выбора частей для слияния</a:t>
+            </a:r>
+            <a:endParaRPr lang="ru-RU" dirty="0"/>
+          </a:p>
+        </p:txBody>
+      </p:sp>
+      <p:pic>
+        <p:nvPicPr>
+          <p:cNvPr id="1026" name="Picture 2" descr="912028c1"/>
+          <p:cNvPicPr>
+            <a:picLocks noChangeAspect="1" noChangeArrowheads="1"/>
+          </p:cNvPicPr>
+          <p:nvPr/>
+        </p:nvPicPr>
+        <p:blipFill>
+          <a:blip r:embed="rId2">
+            <a:extLst>
+              <a:ext uri="{28A0092B-C50C-407E-A947-70E740481C1C}">
+                <a14:useLocalDpi xmlns:a14="http://schemas.microsoft.com/office/drawing/2010/main" val="0"/>
+              </a:ext>
+            </a:extLst>
+          </a:blip>
+          <a:srcRect/>
+          <a:stretch>
+            <a:fillRect/>
+          </a:stretch>
+        </p:blipFill>
+        <p:spPr bwMode="auto">
+          <a:xfrm>
+            <a:off x="1951616" y="1005454"/>
+            <a:ext cx="5187771" cy="2387225"/>
           </a:xfrm>
           <a:prstGeom prst="rect">
             <a:avLst/>
           </a:prstGeom>
+          <a:noFill/>
+          <a:ln>
+            <a:noFill/>
+          </a:ln>
+          <a:extLst>
+            <a:ext uri="{909E8E84-426E-40DD-AFC4-6F175D3DCCD1}">
+              <a14:hiddenFill xmlns:a14="http://schemas.microsoft.com/office/drawing/2010/main">
+                <a:solidFill>
+                  <a:srgbClr val="FFFFFF"/>
+                </a:solidFill>
+              </a14:hiddenFill>
+            </a:ext>
+            <a:ext uri="{91240B29-F687-4F45-9708-019B960494DF}">
+              <a14:hiddenLine xmlns:a14="http://schemas.microsoft.com/office/drawing/2010/main" w="9525">
+                <a:solidFill>
+                  <a:srgbClr val="000000"/>
+                </a:solidFill>
+                <a:miter lim="800000"/>
+                <a:headEnd/>
+                <a:tailEnd/>
+              </a14:hiddenLine>
+            </a:ext>
+          </a:extLst>
         </p:spPr>
-        <p:txBody>
-          <a:bodyPr>
-            <a:spAutoFit/>
-          </a:bodyPr>
-          <a:lstStyle/>
-          <a:p>
-            <a:r>
-              <a:rPr lang="ru-RU" sz="2300" dirty="0">
-                <a:latin typeface="PT Sans" panose="020B0503020203020204" pitchFamily="34" charset="-52"/>
-                <a:ea typeface="PT Sans" panose="020B0503020203020204" pitchFamily="34" charset="-52"/>
-                <a:cs typeface="Times New Roman" panose="02020603050405020304" pitchFamily="18" charset="0"/>
-              </a:rPr>
-              <a:t>Timsort относительно новый вид сортировки — изобретен был в 2002 году Тимом Петерсом.</a:t>
-            </a:r>
-          </a:p>
-        </p:txBody>
-      </p:sp>
+      </p:pic>
     </p:spTree>
+    <p:extLst>
+      <p:ext uri="{BB962C8B-B14F-4D97-AF65-F5344CB8AC3E}">
+        <p14:creationId xmlns:p14="http://schemas.microsoft.com/office/powerpoint/2010/main" val="1992510541"/>
+      </p:ext>
+    </p:extLst>
   </p:cSld>
   <p:clrMapOvr>
     <a:masterClrMapping/>
@@ -13156,7 +12114,7 @@
                             </p:stCondLst>
                             <p:childTnLst>
                               <p:par>
-                                <p:cTn id="5" presetID="10" presetClass="entr" presetSubtype="0" fill="hold" grpId="0" nodeType="afterEffect">
+                                <p:cTn id="5" presetID="22" presetClass="entr" presetSubtype="4" fill="hold" nodeType="afterEffect">
                                   <p:stCondLst>
                                     <p:cond delay="0"/>
                                   </p:stCondLst>
@@ -13169,7 +12127,7 @@
                                           </p:stCondLst>
                                         </p:cTn>
                                         <p:tgtEl>
-                                          <p:spTgt spid="5"/>
+                                          <p:spTgt spid="1026"/>
                                         </p:tgtEl>
                                         <p:attrNameLst>
                                           <p:attrName>style.visibility</p:attrName>
@@ -13179,11 +12137,11 @@
                                         <p:strVal val="visible"/>
                                       </p:to>
                                     </p:set>
-                                    <p:animEffect transition="in" filter="fade">
+                                    <p:animEffect transition="in" filter="wipe(down)">
                                       <p:cBhvr>
                                         <p:cTn id="7" dur="500"/>
                                         <p:tgtEl>
-                                          <p:spTgt spid="5"/>
+                                          <p:spTgt spid="1026"/>
                                         </p:tgtEl>
                                       </p:cBhvr>
                                     </p:animEffect>
@@ -13217,9 +12175,190 @@
         </p:cTn>
       </p:par>
     </p:tnLst>
-    <p:bldLst>
-      <p:bldP spid="5" grpId="0"/>
-    </p:bldLst>
+  </p:timing>
+</p:sld>
+</file>
+
+<file path=ppt/slides/slide8.xml><?xml version="1.0" encoding="utf-8"?>
+<p:sld xmlns:a="http://schemas.openxmlformats.org/drawingml/2006/main" xmlns:r="http://schemas.openxmlformats.org/officeDocument/2006/relationships" xmlns:p="http://schemas.openxmlformats.org/presentationml/2006/main">
+  <p:cSld>
+    <p:spTree>
+      <p:nvGrpSpPr>
+        <p:cNvPr id="1" name=""/>
+        <p:cNvGrpSpPr/>
+        <p:nvPr/>
+      </p:nvGrpSpPr>
+      <p:grpSpPr>
+        <a:xfrm>
+          <a:off x="0" y="0"/>
+          <a:ext cx="0" cy="0"/>
+          <a:chOff x="0" y="0"/>
+          <a:chExt cx="0" cy="0"/>
+        </a:xfrm>
+      </p:grpSpPr>
+      <p:sp>
+        <p:nvSpPr>
+          <p:cNvPr id="2" name="Объект 1"/>
+          <p:cNvSpPr>
+            <a:spLocks noGrp="1"/>
+          </p:cNvSpPr>
+          <p:nvPr>
+            <p:ph idx="1"/>
+          </p:nvPr>
+        </p:nvSpPr>
+        <p:spPr>
+          <a:xfrm>
+            <a:off x="4777098" y="1150733"/>
+            <a:ext cx="4025113" cy="4856960"/>
+          </a:xfrm>
+        </p:spPr>
+        <p:txBody>
+          <a:bodyPr/>
+          <a:lstStyle/>
+          <a:p>
+            <a:pPr lvl="0">
+              <a:buFont typeface="+mj-lt"/>
+              <a:buAutoNum type="arabicPeriod"/>
+            </a:pPr>
+            <a:r>
+              <a:rPr lang="ru-RU" sz="1400" dirty="0"/>
+              <a:t>Начинается процедура слияния, как было показано выше.</a:t>
+            </a:r>
+          </a:p>
+          <a:p>
+            <a:pPr lvl="0">
+              <a:buFont typeface="+mj-lt"/>
+              <a:buAutoNum type="arabicPeriod"/>
+            </a:pPr>
+            <a:r>
+              <a:rPr lang="ru-RU" sz="1400" dirty="0"/>
+              <a:t>На каждой операции копирования элемента из временного или большего </a:t>
+            </a:r>
+            <a:r>
+              <a:rPr lang="ru-RU" sz="1400" dirty="0" err="1"/>
+              <a:t>подмассива</a:t>
+            </a:r>
+            <a:r>
+              <a:rPr lang="ru-RU" sz="1400" dirty="0"/>
+              <a:t> в результирующий запоминается, из какого именно </a:t>
+            </a:r>
+            <a:r>
+              <a:rPr lang="ru-RU" sz="1400" dirty="0" err="1"/>
+              <a:t>подмассива</a:t>
+            </a:r>
+            <a:r>
+              <a:rPr lang="ru-RU" sz="1400" dirty="0"/>
+              <a:t> был элемент.</a:t>
+            </a:r>
+          </a:p>
+          <a:p>
+            <a:pPr lvl="0">
+              <a:buFont typeface="+mj-lt"/>
+              <a:buAutoNum type="arabicPeriod"/>
+            </a:pPr>
+            <a:r>
+              <a:rPr lang="ru-RU" sz="1400" dirty="0"/>
+              <a:t>Если уже некоторое количество элементов (в данной реализации алгоритма это число равно 7) было взято из одного и того же массива — предполагается, что и дальше нам придётся брать данные из него. Чтобы подтвердить эту идею, алгоритм переходит в режим «галопа», то есть перемещается по массиву-претенденту на поставку следующей большой порции данных бинарным поиском (массив упорядочен) текущего элемента из второго соединяемого массива.</a:t>
+            </a:r>
+          </a:p>
+          <a:p>
+            <a:pPr lvl="0">
+              <a:buFont typeface="+mj-lt"/>
+              <a:buAutoNum type="arabicPeriod"/>
+            </a:pPr>
+            <a:r>
+              <a:rPr lang="ru-RU" sz="1400" dirty="0"/>
+              <a:t>В момент, когда данные из текущего массива-поставщика больше не подходят (или был достигнут конец массива), данные копируются целиком.</a:t>
+            </a:r>
+          </a:p>
+        </p:txBody>
+      </p:sp>
+      <p:sp>
+        <p:nvSpPr>
+          <p:cNvPr id="3" name="Заголовок 2"/>
+          <p:cNvSpPr>
+            <a:spLocks noGrp="1"/>
+          </p:cNvSpPr>
+          <p:nvPr>
+            <p:ph type="title"/>
+          </p:nvPr>
+        </p:nvSpPr>
+        <p:spPr>
+          <a:xfrm>
+            <a:off x="854580" y="-9435"/>
+            <a:ext cx="7831372" cy="874143"/>
+          </a:xfrm>
+        </p:spPr>
+        <p:txBody>
+          <a:bodyPr/>
+          <a:lstStyle/>
+          <a:p>
+            <a:r>
+              <a:rPr lang="ru-RU" dirty="0" smtClean="0"/>
+              <a:t>Алгоритм слияния частей </a:t>
+            </a:r>
+            <a:r>
+              <a:rPr lang="en-US" dirty="0" smtClean="0"/>
+              <a:t/>
+            </a:r>
+            <a:br>
+              <a:rPr lang="en-US" dirty="0" smtClean="0"/>
+            </a:br>
+            <a:r>
+              <a:rPr lang="en-US" dirty="0" smtClean="0"/>
+              <a:t>Galloping mode</a:t>
+            </a:r>
+            <a:endParaRPr lang="ru-RU" dirty="0"/>
+          </a:p>
+        </p:txBody>
+      </p:sp>
+      <p:pic>
+        <p:nvPicPr>
+          <p:cNvPr id="4" name="Рисунок 3"/>
+          <p:cNvPicPr>
+            <a:picLocks noChangeAspect="1"/>
+          </p:cNvPicPr>
+          <p:nvPr/>
+        </p:nvPicPr>
+        <p:blipFill>
+          <a:blip r:embed="rId2">
+            <a:extLst>
+              <a:ext uri="{28A0092B-C50C-407E-A947-70E740481C1C}">
+                <a14:useLocalDpi xmlns:a14="http://schemas.microsoft.com/office/drawing/2010/main" val="0"/>
+              </a:ext>
+            </a:extLst>
+          </a:blip>
+          <a:stretch>
+            <a:fillRect/>
+          </a:stretch>
+        </p:blipFill>
+        <p:spPr>
+          <a:xfrm>
+            <a:off x="175965" y="1405785"/>
+            <a:ext cx="4601133" cy="3094525"/>
+          </a:xfrm>
+          <a:prstGeom prst="rect">
+            <a:avLst/>
+          </a:prstGeom>
+        </p:spPr>
+      </p:pic>
+    </p:spTree>
+    <p:extLst>
+      <p:ext uri="{BB962C8B-B14F-4D97-AF65-F5344CB8AC3E}">
+        <p14:creationId xmlns:p14="http://schemas.microsoft.com/office/powerpoint/2010/main" val="882526097"/>
+      </p:ext>
+    </p:extLst>
+  </p:cSld>
+  <p:clrMapOvr>
+    <a:masterClrMapping/>
+  </p:clrMapOvr>
+  <p:transition spd="med" advTm="8000"/>
+  <p:timing>
+    <p:tnLst>
+      <p:par>
+        <p:cTn id="1" dur="indefinite" restart="never" nodeType="tmRoot"/>
+      </p:par>
+    </p:tnLst>
   </p:timing>
 </p:sld>
 </file>
@@ -13253,7 +12392,7 @@
         </p:nvSpPr>
         <p:spPr>
           <a:xfrm>
-            <a:off x="864974" y="-9435"/>
+            <a:off x="864973" y="145841"/>
             <a:ext cx="7820978" cy="726127"/>
           </a:xfrm>
         </p:spPr>
@@ -13296,14 +12435,14 @@
                 <a:gridCol w="4064000">
                   <a:extLst>
                     <a:ext uri="{9D8B030D-6E8A-4147-A177-3AD203B41FA5}">
-                      <a16:colId xmlns:a16="http://schemas.microsoft.com/office/drawing/2014/main" val="1738528753"/>
+                      <a16:colId xmlns="" xmlns:a16="http://schemas.microsoft.com/office/drawing/2014/main" val="1738528753"/>
                     </a:ext>
                   </a:extLst>
                 </a:gridCol>
                 <a:gridCol w="4064000">
                   <a:extLst>
                     <a:ext uri="{9D8B030D-6E8A-4147-A177-3AD203B41FA5}">
-                      <a16:colId xmlns:a16="http://schemas.microsoft.com/office/drawing/2014/main" val="1557783038"/>
+                      <a16:colId xmlns="" xmlns:a16="http://schemas.microsoft.com/office/drawing/2014/main" val="1557783038"/>
                     </a:ext>
                   </a:extLst>
                 </a:gridCol>
@@ -13348,7 +12487,7 @@
                 </a:tc>
                 <a:extLst>
                   <a:ext uri="{0D108BD9-81ED-4DB2-BD59-A6C34878D82A}">
-                    <a16:rowId xmlns:a16="http://schemas.microsoft.com/office/drawing/2014/main" val="506308059"/>
+                    <a16:rowId xmlns="" xmlns:a16="http://schemas.microsoft.com/office/drawing/2014/main" val="506308059"/>
                   </a:ext>
                 </a:extLst>
               </a:tr>
@@ -13397,7 +12536,7 @@
                 </a:tc>
                 <a:extLst>
                   <a:ext uri="{0D108BD9-81ED-4DB2-BD59-A6C34878D82A}">
-                    <a16:rowId xmlns:a16="http://schemas.microsoft.com/office/drawing/2014/main" val="2085759425"/>
+                    <a16:rowId xmlns="" xmlns:a16="http://schemas.microsoft.com/office/drawing/2014/main" val="2085759425"/>
                   </a:ext>
                 </a:extLst>
               </a:tr>
@@ -13442,7 +12581,7 @@
                 </a:tc>
                 <a:extLst>
                   <a:ext uri="{0D108BD9-81ED-4DB2-BD59-A6C34878D82A}">
-                    <a16:rowId xmlns:a16="http://schemas.microsoft.com/office/drawing/2014/main" val="3433221080"/>
+                    <a16:rowId xmlns="" xmlns:a16="http://schemas.microsoft.com/office/drawing/2014/main" val="3433221080"/>
                   </a:ext>
                 </a:extLst>
               </a:tr>
@@ -13468,7 +12607,7 @@
         </p:spPr>
         <p:txBody>
           <a:bodyPr>
-            <a:normAutofit/>
+            <a:normAutofit lnSpcReduction="10000"/>
           </a:bodyPr>
           <a:lstStyle/>
           <a:p>

</xml_diff>